<commit_message>
changed maven to gradle | working FallbackProvider
</commit_message>
<xml_diff>
--- a/spring/spring-netflix-demo/micro-service-flow.pptx
+++ b/spring/spring-netflix-demo/micro-service-flow.pptx
@@ -53,7 +53,7 @@
       </p:grpSpPr>
       <p:sp>
         <p:nvSpPr>
-          <p:cNvPr id="27" name="PlaceHolder 1"/>
+          <p:cNvPr id="23" name="PlaceHolder 1"/>
           <p:cNvSpPr>
             <a:spLocks noGrp="1"/>
           </p:cNvSpPr>
@@ -64,7 +64,7 @@
         <p:spPr>
           <a:xfrm>
             <a:off x="504000" y="216000"/>
-            <a:ext cx="7020000" cy="936000"/>
+            <a:ext cx="7019640" cy="935640"/>
           </a:xfrm>
           <a:prstGeom prst="rect">
             <a:avLst/>
@@ -73,18 +73,16 @@
         <p:txBody>
           <a:bodyPr lIns="0" rIns="0" tIns="0" bIns="0" anchor="ctr"/>
           <a:p>
-            <a:endParaRPr b="0" lang="en-IN" sz="3570" spc="-1" strike="noStrike">
-              <a:solidFill>
-                <a:srgbClr val="ffffff"/>
-              </a:solidFill>
-              <a:latin typeface="Arial"/>
-            </a:endParaRPr>
-          </a:p>
-        </p:txBody>
-      </p:sp>
-      <p:sp>
-        <p:nvSpPr>
-          <p:cNvPr id="28" name="PlaceHolder 2"/>
+            <a:pPr algn="ctr"/>
+            <a:endParaRPr b="0" lang="en-IN" sz="4400" spc="-1" strike="noStrike">
+              <a:latin typeface="Arial"/>
+            </a:endParaRPr>
+          </a:p>
+        </p:txBody>
+      </p:sp>
+      <p:sp>
+        <p:nvSpPr>
+          <p:cNvPr id="24" name="PlaceHolder 2"/>
           <p:cNvSpPr>
             <a:spLocks noGrp="1"/>
           </p:cNvSpPr>
@@ -94,8 +92,8 @@
         </p:nvSpPr>
         <p:spPr>
           <a:xfrm>
-            <a:off x="504000" y="1368000"/>
-            <a:ext cx="9072000" cy="1568160"/>
+            <a:off x="504000" y="1326600"/>
+            <a:ext cx="9072000" cy="1568520"/>
           </a:xfrm>
           <a:prstGeom prst="rect">
             <a:avLst/>
@@ -106,15 +104,15 @@
             <a:normAutofit/>
           </a:bodyPr>
           <a:p>
-            <a:endParaRPr b="0" lang="en-IN" sz="2600" spc="-1" strike="noStrike">
-              <a:latin typeface="Arial"/>
-            </a:endParaRPr>
-          </a:p>
-        </p:txBody>
-      </p:sp>
-      <p:sp>
-        <p:nvSpPr>
-          <p:cNvPr id="29" name="PlaceHolder 3"/>
+            <a:endParaRPr b="0" lang="en-IN" sz="3200" spc="-1" strike="noStrike">
+              <a:latin typeface="Arial"/>
+            </a:endParaRPr>
+          </a:p>
+        </p:txBody>
+      </p:sp>
+      <p:sp>
+        <p:nvSpPr>
+          <p:cNvPr id="25" name="PlaceHolder 3"/>
           <p:cNvSpPr>
             <a:spLocks noGrp="1"/>
           </p:cNvSpPr>
@@ -124,8 +122,8 @@
         </p:nvSpPr>
         <p:spPr>
           <a:xfrm>
-            <a:off x="504000" y="3085560"/>
-            <a:ext cx="9072000" cy="1568160"/>
+            <a:off x="504000" y="3044520"/>
+            <a:ext cx="9072000" cy="1568520"/>
           </a:xfrm>
           <a:prstGeom prst="rect">
             <a:avLst/>
@@ -136,7 +134,7 @@
             <a:normAutofit/>
           </a:bodyPr>
           <a:p>
-            <a:endParaRPr b="0" lang="en-IN" sz="2600" spc="-1" strike="noStrike">
+            <a:endParaRPr b="0" lang="en-IN" sz="3200" spc="-1" strike="noStrike">
               <a:latin typeface="Arial"/>
             </a:endParaRPr>
           </a:p>
@@ -166,7 +164,7 @@
       </p:grpSpPr>
       <p:sp>
         <p:nvSpPr>
-          <p:cNvPr id="30" name="PlaceHolder 1"/>
+          <p:cNvPr id="26" name="PlaceHolder 1"/>
           <p:cNvSpPr>
             <a:spLocks noGrp="1"/>
           </p:cNvSpPr>
@@ -177,7 +175,7 @@
         <p:spPr>
           <a:xfrm>
             <a:off x="504000" y="216000"/>
-            <a:ext cx="7020000" cy="936000"/>
+            <a:ext cx="7019640" cy="935640"/>
           </a:xfrm>
           <a:prstGeom prst="rect">
             <a:avLst/>
@@ -186,18 +184,16 @@
         <p:txBody>
           <a:bodyPr lIns="0" rIns="0" tIns="0" bIns="0" anchor="ctr"/>
           <a:p>
-            <a:endParaRPr b="0" lang="en-IN" sz="3570" spc="-1" strike="noStrike">
-              <a:solidFill>
-                <a:srgbClr val="ffffff"/>
-              </a:solidFill>
-              <a:latin typeface="Arial"/>
-            </a:endParaRPr>
-          </a:p>
-        </p:txBody>
-      </p:sp>
-      <p:sp>
-        <p:nvSpPr>
-          <p:cNvPr id="31" name="PlaceHolder 2"/>
+            <a:pPr algn="ctr"/>
+            <a:endParaRPr b="0" lang="en-IN" sz="4400" spc="-1" strike="noStrike">
+              <a:latin typeface="Arial"/>
+            </a:endParaRPr>
+          </a:p>
+        </p:txBody>
+      </p:sp>
+      <p:sp>
+        <p:nvSpPr>
+          <p:cNvPr id="27" name="PlaceHolder 2"/>
           <p:cNvSpPr>
             <a:spLocks noGrp="1"/>
           </p:cNvSpPr>
@@ -207,8 +203,8 @@
         </p:nvSpPr>
         <p:spPr>
           <a:xfrm>
-            <a:off x="504000" y="1368000"/>
-            <a:ext cx="4426920" cy="1568160"/>
+            <a:off x="504000" y="1326600"/>
+            <a:ext cx="4426920" cy="1568520"/>
           </a:xfrm>
           <a:prstGeom prst="rect">
             <a:avLst/>
@@ -219,15 +215,15 @@
             <a:normAutofit/>
           </a:bodyPr>
           <a:p>
-            <a:endParaRPr b="0" lang="en-IN" sz="2600" spc="-1" strike="noStrike">
-              <a:latin typeface="Arial"/>
-            </a:endParaRPr>
-          </a:p>
-        </p:txBody>
-      </p:sp>
-      <p:sp>
-        <p:nvSpPr>
-          <p:cNvPr id="32" name="PlaceHolder 3"/>
+            <a:endParaRPr b="0" lang="en-IN" sz="3200" spc="-1" strike="noStrike">
+              <a:latin typeface="Arial"/>
+            </a:endParaRPr>
+          </a:p>
+        </p:txBody>
+      </p:sp>
+      <p:sp>
+        <p:nvSpPr>
+          <p:cNvPr id="28" name="PlaceHolder 3"/>
           <p:cNvSpPr>
             <a:spLocks noGrp="1"/>
           </p:cNvSpPr>
@@ -237,8 +233,8 @@
         </p:nvSpPr>
         <p:spPr>
           <a:xfrm>
-            <a:off x="5152680" y="1368000"/>
-            <a:ext cx="4426920" cy="1568160"/>
+            <a:off x="5152680" y="1326600"/>
+            <a:ext cx="4426920" cy="1568520"/>
           </a:xfrm>
           <a:prstGeom prst="rect">
             <a:avLst/>
@@ -249,15 +245,15 @@
             <a:normAutofit/>
           </a:bodyPr>
           <a:p>
-            <a:endParaRPr b="0" lang="en-IN" sz="2600" spc="-1" strike="noStrike">
-              <a:latin typeface="Arial"/>
-            </a:endParaRPr>
-          </a:p>
-        </p:txBody>
-      </p:sp>
-      <p:sp>
-        <p:nvSpPr>
-          <p:cNvPr id="33" name="PlaceHolder 4"/>
+            <a:endParaRPr b="0" lang="en-IN" sz="3200" spc="-1" strike="noStrike">
+              <a:latin typeface="Arial"/>
+            </a:endParaRPr>
+          </a:p>
+        </p:txBody>
+      </p:sp>
+      <p:sp>
+        <p:nvSpPr>
+          <p:cNvPr id="29" name="PlaceHolder 4"/>
           <p:cNvSpPr>
             <a:spLocks noGrp="1"/>
           </p:cNvSpPr>
@@ -267,8 +263,8 @@
         </p:nvSpPr>
         <p:spPr>
           <a:xfrm>
-            <a:off x="504000" y="3085560"/>
-            <a:ext cx="4426920" cy="1568160"/>
+            <a:off x="504000" y="3044520"/>
+            <a:ext cx="4426920" cy="1568520"/>
           </a:xfrm>
           <a:prstGeom prst="rect">
             <a:avLst/>
@@ -279,15 +275,15 @@
             <a:normAutofit/>
           </a:bodyPr>
           <a:p>
-            <a:endParaRPr b="0" lang="en-IN" sz="2600" spc="-1" strike="noStrike">
-              <a:latin typeface="Arial"/>
-            </a:endParaRPr>
-          </a:p>
-        </p:txBody>
-      </p:sp>
-      <p:sp>
-        <p:nvSpPr>
-          <p:cNvPr id="34" name="PlaceHolder 5"/>
+            <a:endParaRPr b="0" lang="en-IN" sz="3200" spc="-1" strike="noStrike">
+              <a:latin typeface="Arial"/>
+            </a:endParaRPr>
+          </a:p>
+        </p:txBody>
+      </p:sp>
+      <p:sp>
+        <p:nvSpPr>
+          <p:cNvPr id="30" name="PlaceHolder 5"/>
           <p:cNvSpPr>
             <a:spLocks noGrp="1"/>
           </p:cNvSpPr>
@@ -297,8 +293,8 @@
         </p:nvSpPr>
         <p:spPr>
           <a:xfrm>
-            <a:off x="5152680" y="3085560"/>
-            <a:ext cx="4426920" cy="1568160"/>
+            <a:off x="5152680" y="3044520"/>
+            <a:ext cx="4426920" cy="1568520"/>
           </a:xfrm>
           <a:prstGeom prst="rect">
             <a:avLst/>
@@ -309,7 +305,7 @@
             <a:normAutofit/>
           </a:bodyPr>
           <a:p>
-            <a:endParaRPr b="0" lang="en-IN" sz="2600" spc="-1" strike="noStrike">
+            <a:endParaRPr b="0" lang="en-IN" sz="3200" spc="-1" strike="noStrike">
               <a:latin typeface="Arial"/>
             </a:endParaRPr>
           </a:p>
@@ -339,7 +335,7 @@
       </p:grpSpPr>
       <p:sp>
         <p:nvSpPr>
-          <p:cNvPr id="35" name="PlaceHolder 1"/>
+          <p:cNvPr id="31" name="PlaceHolder 1"/>
           <p:cNvSpPr>
             <a:spLocks noGrp="1"/>
           </p:cNvSpPr>
@@ -350,7 +346,7 @@
         <p:spPr>
           <a:xfrm>
             <a:off x="504000" y="216000"/>
-            <a:ext cx="7020000" cy="936000"/>
+            <a:ext cx="7019640" cy="935640"/>
           </a:xfrm>
           <a:prstGeom prst="rect">
             <a:avLst/>
@@ -359,18 +355,16 @@
         <p:txBody>
           <a:bodyPr lIns="0" rIns="0" tIns="0" bIns="0" anchor="ctr"/>
           <a:p>
-            <a:endParaRPr b="0" lang="en-IN" sz="3570" spc="-1" strike="noStrike">
-              <a:solidFill>
-                <a:srgbClr val="ffffff"/>
-              </a:solidFill>
-              <a:latin typeface="Arial"/>
-            </a:endParaRPr>
-          </a:p>
-        </p:txBody>
-      </p:sp>
-      <p:sp>
-        <p:nvSpPr>
-          <p:cNvPr id="36" name="PlaceHolder 2"/>
+            <a:pPr algn="ctr"/>
+            <a:endParaRPr b="0" lang="en-IN" sz="4400" spc="-1" strike="noStrike">
+              <a:latin typeface="Arial"/>
+            </a:endParaRPr>
+          </a:p>
+        </p:txBody>
+      </p:sp>
+      <p:sp>
+        <p:nvSpPr>
+          <p:cNvPr id="32" name="PlaceHolder 2"/>
           <p:cNvSpPr>
             <a:spLocks noGrp="1"/>
           </p:cNvSpPr>
@@ -380,8 +374,8 @@
         </p:nvSpPr>
         <p:spPr>
           <a:xfrm>
-            <a:off x="504000" y="1368000"/>
-            <a:ext cx="2921040" cy="1568160"/>
+            <a:off x="504000" y="1326600"/>
+            <a:ext cx="2921040" cy="1568520"/>
           </a:xfrm>
           <a:prstGeom prst="rect">
             <a:avLst/>
@@ -392,15 +386,15 @@
             <a:normAutofit/>
           </a:bodyPr>
           <a:p>
-            <a:endParaRPr b="0" lang="en-IN" sz="2600" spc="-1" strike="noStrike">
-              <a:latin typeface="Arial"/>
-            </a:endParaRPr>
-          </a:p>
-        </p:txBody>
-      </p:sp>
-      <p:sp>
-        <p:nvSpPr>
-          <p:cNvPr id="37" name="PlaceHolder 3"/>
+            <a:endParaRPr b="0" lang="en-IN" sz="3200" spc="-1" strike="noStrike">
+              <a:latin typeface="Arial"/>
+            </a:endParaRPr>
+          </a:p>
+        </p:txBody>
+      </p:sp>
+      <p:sp>
+        <p:nvSpPr>
+          <p:cNvPr id="33" name="PlaceHolder 3"/>
           <p:cNvSpPr>
             <a:spLocks noGrp="1"/>
           </p:cNvSpPr>
@@ -410,8 +404,8 @@
         </p:nvSpPr>
         <p:spPr>
           <a:xfrm>
-            <a:off x="3571560" y="1368000"/>
-            <a:ext cx="2921040" cy="1568160"/>
+            <a:off x="3571560" y="1326600"/>
+            <a:ext cx="2921040" cy="1568520"/>
           </a:xfrm>
           <a:prstGeom prst="rect">
             <a:avLst/>
@@ -422,15 +416,15 @@
             <a:normAutofit/>
           </a:bodyPr>
           <a:p>
-            <a:endParaRPr b="0" lang="en-IN" sz="2600" spc="-1" strike="noStrike">
-              <a:latin typeface="Arial"/>
-            </a:endParaRPr>
-          </a:p>
-        </p:txBody>
-      </p:sp>
-      <p:sp>
-        <p:nvSpPr>
-          <p:cNvPr id="38" name="PlaceHolder 4"/>
+            <a:endParaRPr b="0" lang="en-IN" sz="3200" spc="-1" strike="noStrike">
+              <a:latin typeface="Arial"/>
+            </a:endParaRPr>
+          </a:p>
+        </p:txBody>
+      </p:sp>
+      <p:sp>
+        <p:nvSpPr>
+          <p:cNvPr id="34" name="PlaceHolder 4"/>
           <p:cNvSpPr>
             <a:spLocks noGrp="1"/>
           </p:cNvSpPr>
@@ -440,8 +434,8 @@
         </p:nvSpPr>
         <p:spPr>
           <a:xfrm>
-            <a:off x="6639120" y="1368000"/>
-            <a:ext cx="2921040" cy="1568160"/>
+            <a:off x="6639120" y="1326600"/>
+            <a:ext cx="2921040" cy="1568520"/>
           </a:xfrm>
           <a:prstGeom prst="rect">
             <a:avLst/>
@@ -452,15 +446,15 @@
             <a:normAutofit/>
           </a:bodyPr>
           <a:p>
-            <a:endParaRPr b="0" lang="en-IN" sz="2600" spc="-1" strike="noStrike">
-              <a:latin typeface="Arial"/>
-            </a:endParaRPr>
-          </a:p>
-        </p:txBody>
-      </p:sp>
-      <p:sp>
-        <p:nvSpPr>
-          <p:cNvPr id="39" name="PlaceHolder 5"/>
+            <a:endParaRPr b="0" lang="en-IN" sz="3200" spc="-1" strike="noStrike">
+              <a:latin typeface="Arial"/>
+            </a:endParaRPr>
+          </a:p>
+        </p:txBody>
+      </p:sp>
+      <p:sp>
+        <p:nvSpPr>
+          <p:cNvPr id="35" name="PlaceHolder 5"/>
           <p:cNvSpPr>
             <a:spLocks noGrp="1"/>
           </p:cNvSpPr>
@@ -470,8 +464,8 @@
         </p:nvSpPr>
         <p:spPr>
           <a:xfrm>
-            <a:off x="504000" y="3085560"/>
-            <a:ext cx="2921040" cy="1568160"/>
+            <a:off x="504000" y="3044520"/>
+            <a:ext cx="2921040" cy="1568520"/>
           </a:xfrm>
           <a:prstGeom prst="rect">
             <a:avLst/>
@@ -482,15 +476,15 @@
             <a:normAutofit/>
           </a:bodyPr>
           <a:p>
-            <a:endParaRPr b="0" lang="en-IN" sz="2600" spc="-1" strike="noStrike">
-              <a:latin typeface="Arial"/>
-            </a:endParaRPr>
-          </a:p>
-        </p:txBody>
-      </p:sp>
-      <p:sp>
-        <p:nvSpPr>
-          <p:cNvPr id="40" name="PlaceHolder 6"/>
+            <a:endParaRPr b="0" lang="en-IN" sz="3200" spc="-1" strike="noStrike">
+              <a:latin typeface="Arial"/>
+            </a:endParaRPr>
+          </a:p>
+        </p:txBody>
+      </p:sp>
+      <p:sp>
+        <p:nvSpPr>
+          <p:cNvPr id="36" name="PlaceHolder 6"/>
           <p:cNvSpPr>
             <a:spLocks noGrp="1"/>
           </p:cNvSpPr>
@@ -500,8 +494,8 @@
         </p:nvSpPr>
         <p:spPr>
           <a:xfrm>
-            <a:off x="3571560" y="3085560"/>
-            <a:ext cx="2921040" cy="1568160"/>
+            <a:off x="3571560" y="3044520"/>
+            <a:ext cx="2921040" cy="1568520"/>
           </a:xfrm>
           <a:prstGeom prst="rect">
             <a:avLst/>
@@ -512,15 +506,15 @@
             <a:normAutofit/>
           </a:bodyPr>
           <a:p>
-            <a:endParaRPr b="0" lang="en-IN" sz="2600" spc="-1" strike="noStrike">
-              <a:latin typeface="Arial"/>
-            </a:endParaRPr>
-          </a:p>
-        </p:txBody>
-      </p:sp>
-      <p:sp>
-        <p:nvSpPr>
-          <p:cNvPr id="41" name="PlaceHolder 7"/>
+            <a:endParaRPr b="0" lang="en-IN" sz="3200" spc="-1" strike="noStrike">
+              <a:latin typeface="Arial"/>
+            </a:endParaRPr>
+          </a:p>
+        </p:txBody>
+      </p:sp>
+      <p:sp>
+        <p:nvSpPr>
+          <p:cNvPr id="37" name="PlaceHolder 7"/>
           <p:cNvSpPr>
             <a:spLocks noGrp="1"/>
           </p:cNvSpPr>
@@ -530,8 +524,8 @@
         </p:nvSpPr>
         <p:spPr>
           <a:xfrm>
-            <a:off x="6639120" y="3085560"/>
-            <a:ext cx="2921040" cy="1568160"/>
+            <a:off x="6639120" y="3044520"/>
+            <a:ext cx="2921040" cy="1568520"/>
           </a:xfrm>
           <a:prstGeom prst="rect">
             <a:avLst/>
@@ -542,7 +536,7 @@
             <a:normAutofit/>
           </a:bodyPr>
           <a:p>
-            <a:endParaRPr b="0" lang="en-IN" sz="2600" spc="-1" strike="noStrike">
+            <a:endParaRPr b="0" lang="en-IN" sz="3200" spc="-1" strike="noStrike">
               <a:latin typeface="Arial"/>
             </a:endParaRPr>
           </a:p>
@@ -572,7 +566,7 @@
       </p:grpSpPr>
       <p:sp>
         <p:nvSpPr>
-          <p:cNvPr id="6" name="PlaceHolder 1"/>
+          <p:cNvPr id="2" name="PlaceHolder 1"/>
           <p:cNvSpPr>
             <a:spLocks noGrp="1"/>
           </p:cNvSpPr>
@@ -583,7 +577,7 @@
         <p:spPr>
           <a:xfrm>
             <a:off x="504000" y="216000"/>
-            <a:ext cx="7020000" cy="936000"/>
+            <a:ext cx="7019640" cy="935640"/>
           </a:xfrm>
           <a:prstGeom prst="rect">
             <a:avLst/>
@@ -592,18 +586,16 @@
         <p:txBody>
           <a:bodyPr lIns="0" rIns="0" tIns="0" bIns="0" anchor="ctr"/>
           <a:p>
-            <a:endParaRPr b="0" lang="en-IN" sz="3570" spc="-1" strike="noStrike">
-              <a:solidFill>
-                <a:srgbClr val="ffffff"/>
-              </a:solidFill>
-              <a:latin typeface="Arial"/>
-            </a:endParaRPr>
-          </a:p>
-        </p:txBody>
-      </p:sp>
-      <p:sp>
-        <p:nvSpPr>
-          <p:cNvPr id="7" name="PlaceHolder 2"/>
+            <a:pPr algn="ctr"/>
+            <a:endParaRPr b="0" lang="en-IN" sz="4400" spc="-1" strike="noStrike">
+              <a:latin typeface="Arial"/>
+            </a:endParaRPr>
+          </a:p>
+        </p:txBody>
+      </p:sp>
+      <p:sp>
+        <p:nvSpPr>
+          <p:cNvPr id="3" name="PlaceHolder 2"/>
           <p:cNvSpPr>
             <a:spLocks noGrp="1"/>
           </p:cNvSpPr>
@@ -613,8 +605,8 @@
         </p:nvSpPr>
         <p:spPr>
           <a:xfrm>
-            <a:off x="504000" y="1368000"/>
-            <a:ext cx="9072000" cy="3288240"/>
+            <a:off x="504000" y="1326600"/>
+            <a:ext cx="9072000" cy="3288600"/>
           </a:xfrm>
           <a:prstGeom prst="rect">
             <a:avLst/>
@@ -654,7 +646,7 @@
       </p:grpSpPr>
       <p:sp>
         <p:nvSpPr>
-          <p:cNvPr id="8" name="PlaceHolder 1"/>
+          <p:cNvPr id="4" name="PlaceHolder 1"/>
           <p:cNvSpPr>
             <a:spLocks noGrp="1"/>
           </p:cNvSpPr>
@@ -665,7 +657,7 @@
         <p:spPr>
           <a:xfrm>
             <a:off x="504000" y="216000"/>
-            <a:ext cx="7020000" cy="936000"/>
+            <a:ext cx="7019640" cy="935640"/>
           </a:xfrm>
           <a:prstGeom prst="rect">
             <a:avLst/>
@@ -674,18 +666,16 @@
         <p:txBody>
           <a:bodyPr lIns="0" rIns="0" tIns="0" bIns="0" anchor="ctr"/>
           <a:p>
-            <a:endParaRPr b="0" lang="en-IN" sz="3570" spc="-1" strike="noStrike">
-              <a:solidFill>
-                <a:srgbClr val="ffffff"/>
-              </a:solidFill>
-              <a:latin typeface="Arial"/>
-            </a:endParaRPr>
-          </a:p>
-        </p:txBody>
-      </p:sp>
-      <p:sp>
-        <p:nvSpPr>
-          <p:cNvPr id="9" name="PlaceHolder 2"/>
+            <a:pPr algn="ctr"/>
+            <a:endParaRPr b="0" lang="en-IN" sz="4400" spc="-1" strike="noStrike">
+              <a:latin typeface="Arial"/>
+            </a:endParaRPr>
+          </a:p>
+        </p:txBody>
+      </p:sp>
+      <p:sp>
+        <p:nvSpPr>
+          <p:cNvPr id="5" name="PlaceHolder 2"/>
           <p:cNvSpPr>
             <a:spLocks noGrp="1"/>
           </p:cNvSpPr>
@@ -695,8 +685,8 @@
         </p:nvSpPr>
         <p:spPr>
           <a:xfrm>
-            <a:off x="504000" y="1368000"/>
-            <a:ext cx="9072000" cy="3288240"/>
+            <a:off x="504000" y="1326600"/>
+            <a:ext cx="9072000" cy="3288600"/>
           </a:xfrm>
           <a:prstGeom prst="rect">
             <a:avLst/>
@@ -707,7 +697,7 @@
             <a:normAutofit/>
           </a:bodyPr>
           <a:p>
-            <a:endParaRPr b="0" lang="en-IN" sz="2600" spc="-1" strike="noStrike">
+            <a:endParaRPr b="0" lang="en-IN" sz="3200" spc="-1" strike="noStrike">
               <a:latin typeface="Arial"/>
             </a:endParaRPr>
           </a:p>
@@ -737,7 +727,7 @@
       </p:grpSpPr>
       <p:sp>
         <p:nvSpPr>
-          <p:cNvPr id="10" name="PlaceHolder 1"/>
+          <p:cNvPr id="6" name="PlaceHolder 1"/>
           <p:cNvSpPr>
             <a:spLocks noGrp="1"/>
           </p:cNvSpPr>
@@ -748,7 +738,7 @@
         <p:spPr>
           <a:xfrm>
             <a:off x="504000" y="216000"/>
-            <a:ext cx="7020000" cy="936000"/>
+            <a:ext cx="7019640" cy="935640"/>
           </a:xfrm>
           <a:prstGeom prst="rect">
             <a:avLst/>
@@ -757,18 +747,16 @@
         <p:txBody>
           <a:bodyPr lIns="0" rIns="0" tIns="0" bIns="0" anchor="ctr"/>
           <a:p>
-            <a:endParaRPr b="0" lang="en-IN" sz="3570" spc="-1" strike="noStrike">
-              <a:solidFill>
-                <a:srgbClr val="ffffff"/>
-              </a:solidFill>
-              <a:latin typeface="Arial"/>
-            </a:endParaRPr>
-          </a:p>
-        </p:txBody>
-      </p:sp>
-      <p:sp>
-        <p:nvSpPr>
-          <p:cNvPr id="11" name="PlaceHolder 2"/>
+            <a:pPr algn="ctr"/>
+            <a:endParaRPr b="0" lang="en-IN" sz="4400" spc="-1" strike="noStrike">
+              <a:latin typeface="Arial"/>
+            </a:endParaRPr>
+          </a:p>
+        </p:txBody>
+      </p:sp>
+      <p:sp>
+        <p:nvSpPr>
+          <p:cNvPr id="7" name="PlaceHolder 2"/>
           <p:cNvSpPr>
             <a:spLocks noGrp="1"/>
           </p:cNvSpPr>
@@ -778,8 +766,8 @@
         </p:nvSpPr>
         <p:spPr>
           <a:xfrm>
-            <a:off x="504000" y="1368000"/>
-            <a:ext cx="4426920" cy="3288240"/>
+            <a:off x="504000" y="1326600"/>
+            <a:ext cx="4426920" cy="3288600"/>
           </a:xfrm>
           <a:prstGeom prst="rect">
             <a:avLst/>
@@ -790,15 +778,15 @@
             <a:normAutofit/>
           </a:bodyPr>
           <a:p>
-            <a:endParaRPr b="0" lang="en-IN" sz="2600" spc="-1" strike="noStrike">
-              <a:latin typeface="Arial"/>
-            </a:endParaRPr>
-          </a:p>
-        </p:txBody>
-      </p:sp>
-      <p:sp>
-        <p:nvSpPr>
-          <p:cNvPr id="12" name="PlaceHolder 3"/>
+            <a:endParaRPr b="0" lang="en-IN" sz="3200" spc="-1" strike="noStrike">
+              <a:latin typeface="Arial"/>
+            </a:endParaRPr>
+          </a:p>
+        </p:txBody>
+      </p:sp>
+      <p:sp>
+        <p:nvSpPr>
+          <p:cNvPr id="8" name="PlaceHolder 3"/>
           <p:cNvSpPr>
             <a:spLocks noGrp="1"/>
           </p:cNvSpPr>
@@ -808,8 +796,8 @@
         </p:nvSpPr>
         <p:spPr>
           <a:xfrm>
-            <a:off x="5152680" y="1368000"/>
-            <a:ext cx="4426920" cy="3288240"/>
+            <a:off x="5152680" y="1326600"/>
+            <a:ext cx="4426920" cy="3288600"/>
           </a:xfrm>
           <a:prstGeom prst="rect">
             <a:avLst/>
@@ -820,7 +808,7 @@
             <a:normAutofit/>
           </a:bodyPr>
           <a:p>
-            <a:endParaRPr b="0" lang="en-IN" sz="2600" spc="-1" strike="noStrike">
+            <a:endParaRPr b="0" lang="en-IN" sz="3200" spc="-1" strike="noStrike">
               <a:latin typeface="Arial"/>
             </a:endParaRPr>
           </a:p>
@@ -850,7 +838,7 @@
       </p:grpSpPr>
       <p:sp>
         <p:nvSpPr>
-          <p:cNvPr id="13" name="PlaceHolder 1"/>
+          <p:cNvPr id="9" name="PlaceHolder 1"/>
           <p:cNvSpPr>
             <a:spLocks noGrp="1"/>
           </p:cNvSpPr>
@@ -861,7 +849,7 @@
         <p:spPr>
           <a:xfrm>
             <a:off x="504000" y="216000"/>
-            <a:ext cx="7020000" cy="936000"/>
+            <a:ext cx="7019640" cy="935640"/>
           </a:xfrm>
           <a:prstGeom prst="rect">
             <a:avLst/>
@@ -870,10 +858,8 @@
         <p:txBody>
           <a:bodyPr lIns="0" rIns="0" tIns="0" bIns="0" anchor="ctr"/>
           <a:p>
-            <a:endParaRPr b="0" lang="en-IN" sz="3570" spc="-1" strike="noStrike">
-              <a:solidFill>
-                <a:srgbClr val="ffffff"/>
-              </a:solidFill>
+            <a:pPr algn="ctr"/>
+            <a:endParaRPr b="0" lang="en-IN" sz="4400" spc="-1" strike="noStrike">
               <a:latin typeface="Arial"/>
             </a:endParaRPr>
           </a:p>
@@ -903,7 +889,7 @@
       </p:grpSpPr>
       <p:sp>
         <p:nvSpPr>
-          <p:cNvPr id="14" name="PlaceHolder 1"/>
+          <p:cNvPr id="10" name="PlaceHolder 1"/>
           <p:cNvSpPr>
             <a:spLocks noGrp="1"/>
           </p:cNvSpPr>
@@ -914,7 +900,7 @@
         <p:spPr>
           <a:xfrm>
             <a:off x="504000" y="216000"/>
-            <a:ext cx="7020000" cy="4340160"/>
+            <a:ext cx="7019640" cy="4338360"/>
           </a:xfrm>
           <a:prstGeom prst="rect">
             <a:avLst/>
@@ -954,7 +940,7 @@
       </p:grpSpPr>
       <p:sp>
         <p:nvSpPr>
-          <p:cNvPr id="15" name="PlaceHolder 1"/>
+          <p:cNvPr id="11" name="PlaceHolder 1"/>
           <p:cNvSpPr>
             <a:spLocks noGrp="1"/>
           </p:cNvSpPr>
@@ -965,7 +951,7 @@
         <p:spPr>
           <a:xfrm>
             <a:off x="504000" y="216000"/>
-            <a:ext cx="7020000" cy="936000"/>
+            <a:ext cx="7019640" cy="935640"/>
           </a:xfrm>
           <a:prstGeom prst="rect">
             <a:avLst/>
@@ -974,18 +960,16 @@
         <p:txBody>
           <a:bodyPr lIns="0" rIns="0" tIns="0" bIns="0" anchor="ctr"/>
           <a:p>
-            <a:endParaRPr b="0" lang="en-IN" sz="3570" spc="-1" strike="noStrike">
-              <a:solidFill>
-                <a:srgbClr val="ffffff"/>
-              </a:solidFill>
-              <a:latin typeface="Arial"/>
-            </a:endParaRPr>
-          </a:p>
-        </p:txBody>
-      </p:sp>
-      <p:sp>
-        <p:nvSpPr>
-          <p:cNvPr id="16" name="PlaceHolder 2"/>
+            <a:pPr algn="ctr"/>
+            <a:endParaRPr b="0" lang="en-IN" sz="4400" spc="-1" strike="noStrike">
+              <a:latin typeface="Arial"/>
+            </a:endParaRPr>
+          </a:p>
+        </p:txBody>
+      </p:sp>
+      <p:sp>
+        <p:nvSpPr>
+          <p:cNvPr id="12" name="PlaceHolder 2"/>
           <p:cNvSpPr>
             <a:spLocks noGrp="1"/>
           </p:cNvSpPr>
@@ -995,8 +979,8 @@
         </p:nvSpPr>
         <p:spPr>
           <a:xfrm>
-            <a:off x="504000" y="1368000"/>
-            <a:ext cx="4426920" cy="1568160"/>
+            <a:off x="504000" y="1326600"/>
+            <a:ext cx="4426920" cy="1568520"/>
           </a:xfrm>
           <a:prstGeom prst="rect">
             <a:avLst/>
@@ -1007,15 +991,15 @@
             <a:normAutofit/>
           </a:bodyPr>
           <a:p>
-            <a:endParaRPr b="0" lang="en-IN" sz="2600" spc="-1" strike="noStrike">
-              <a:latin typeface="Arial"/>
-            </a:endParaRPr>
-          </a:p>
-        </p:txBody>
-      </p:sp>
-      <p:sp>
-        <p:nvSpPr>
-          <p:cNvPr id="17" name="PlaceHolder 3"/>
+            <a:endParaRPr b="0" lang="en-IN" sz="3200" spc="-1" strike="noStrike">
+              <a:latin typeface="Arial"/>
+            </a:endParaRPr>
+          </a:p>
+        </p:txBody>
+      </p:sp>
+      <p:sp>
+        <p:nvSpPr>
+          <p:cNvPr id="13" name="PlaceHolder 3"/>
           <p:cNvSpPr>
             <a:spLocks noGrp="1"/>
           </p:cNvSpPr>
@@ -1025,8 +1009,8 @@
         </p:nvSpPr>
         <p:spPr>
           <a:xfrm>
-            <a:off x="5152680" y="1368000"/>
-            <a:ext cx="4426920" cy="3288240"/>
+            <a:off x="5152680" y="1326600"/>
+            <a:ext cx="4426920" cy="3288600"/>
           </a:xfrm>
           <a:prstGeom prst="rect">
             <a:avLst/>
@@ -1037,15 +1021,15 @@
             <a:normAutofit/>
           </a:bodyPr>
           <a:p>
-            <a:endParaRPr b="0" lang="en-IN" sz="2600" spc="-1" strike="noStrike">
-              <a:latin typeface="Arial"/>
-            </a:endParaRPr>
-          </a:p>
-        </p:txBody>
-      </p:sp>
-      <p:sp>
-        <p:nvSpPr>
-          <p:cNvPr id="18" name="PlaceHolder 4"/>
+            <a:endParaRPr b="0" lang="en-IN" sz="3200" spc="-1" strike="noStrike">
+              <a:latin typeface="Arial"/>
+            </a:endParaRPr>
+          </a:p>
+        </p:txBody>
+      </p:sp>
+      <p:sp>
+        <p:nvSpPr>
+          <p:cNvPr id="14" name="PlaceHolder 4"/>
           <p:cNvSpPr>
             <a:spLocks noGrp="1"/>
           </p:cNvSpPr>
@@ -1055,8 +1039,8 @@
         </p:nvSpPr>
         <p:spPr>
           <a:xfrm>
-            <a:off x="504000" y="3085560"/>
-            <a:ext cx="4426920" cy="1568160"/>
+            <a:off x="504000" y="3044520"/>
+            <a:ext cx="4426920" cy="1568520"/>
           </a:xfrm>
           <a:prstGeom prst="rect">
             <a:avLst/>
@@ -1067,7 +1051,7 @@
             <a:normAutofit/>
           </a:bodyPr>
           <a:p>
-            <a:endParaRPr b="0" lang="en-IN" sz="2600" spc="-1" strike="noStrike">
+            <a:endParaRPr b="0" lang="en-IN" sz="3200" spc="-1" strike="noStrike">
               <a:latin typeface="Arial"/>
             </a:endParaRPr>
           </a:p>
@@ -1097,7 +1081,7 @@
       </p:grpSpPr>
       <p:sp>
         <p:nvSpPr>
-          <p:cNvPr id="19" name="PlaceHolder 1"/>
+          <p:cNvPr id="15" name="PlaceHolder 1"/>
           <p:cNvSpPr>
             <a:spLocks noGrp="1"/>
           </p:cNvSpPr>
@@ -1108,7 +1092,7 @@
         <p:spPr>
           <a:xfrm>
             <a:off x="504000" y="216000"/>
-            <a:ext cx="7020000" cy="936000"/>
+            <a:ext cx="7019640" cy="935640"/>
           </a:xfrm>
           <a:prstGeom prst="rect">
             <a:avLst/>
@@ -1117,18 +1101,16 @@
         <p:txBody>
           <a:bodyPr lIns="0" rIns="0" tIns="0" bIns="0" anchor="ctr"/>
           <a:p>
-            <a:endParaRPr b="0" lang="en-IN" sz="3570" spc="-1" strike="noStrike">
-              <a:solidFill>
-                <a:srgbClr val="ffffff"/>
-              </a:solidFill>
-              <a:latin typeface="Arial"/>
-            </a:endParaRPr>
-          </a:p>
-        </p:txBody>
-      </p:sp>
-      <p:sp>
-        <p:nvSpPr>
-          <p:cNvPr id="20" name="PlaceHolder 2"/>
+            <a:pPr algn="ctr"/>
+            <a:endParaRPr b="0" lang="en-IN" sz="4400" spc="-1" strike="noStrike">
+              <a:latin typeface="Arial"/>
+            </a:endParaRPr>
+          </a:p>
+        </p:txBody>
+      </p:sp>
+      <p:sp>
+        <p:nvSpPr>
+          <p:cNvPr id="16" name="PlaceHolder 2"/>
           <p:cNvSpPr>
             <a:spLocks noGrp="1"/>
           </p:cNvSpPr>
@@ -1138,8 +1120,8 @@
         </p:nvSpPr>
         <p:spPr>
           <a:xfrm>
-            <a:off x="504000" y="1368000"/>
-            <a:ext cx="4426920" cy="3288240"/>
+            <a:off x="504000" y="1326600"/>
+            <a:ext cx="4426920" cy="3288600"/>
           </a:xfrm>
           <a:prstGeom prst="rect">
             <a:avLst/>
@@ -1150,15 +1132,15 @@
             <a:normAutofit/>
           </a:bodyPr>
           <a:p>
-            <a:endParaRPr b="0" lang="en-IN" sz="2600" spc="-1" strike="noStrike">
-              <a:latin typeface="Arial"/>
-            </a:endParaRPr>
-          </a:p>
-        </p:txBody>
-      </p:sp>
-      <p:sp>
-        <p:nvSpPr>
-          <p:cNvPr id="21" name="PlaceHolder 3"/>
+            <a:endParaRPr b="0" lang="en-IN" sz="3200" spc="-1" strike="noStrike">
+              <a:latin typeface="Arial"/>
+            </a:endParaRPr>
+          </a:p>
+        </p:txBody>
+      </p:sp>
+      <p:sp>
+        <p:nvSpPr>
+          <p:cNvPr id="17" name="PlaceHolder 3"/>
           <p:cNvSpPr>
             <a:spLocks noGrp="1"/>
           </p:cNvSpPr>
@@ -1168,8 +1150,8 @@
         </p:nvSpPr>
         <p:spPr>
           <a:xfrm>
-            <a:off x="5152680" y="1368000"/>
-            <a:ext cx="4426920" cy="1568160"/>
+            <a:off x="5152680" y="1326600"/>
+            <a:ext cx="4426920" cy="1568520"/>
           </a:xfrm>
           <a:prstGeom prst="rect">
             <a:avLst/>
@@ -1180,15 +1162,15 @@
             <a:normAutofit/>
           </a:bodyPr>
           <a:p>
-            <a:endParaRPr b="0" lang="en-IN" sz="2600" spc="-1" strike="noStrike">
-              <a:latin typeface="Arial"/>
-            </a:endParaRPr>
-          </a:p>
-        </p:txBody>
-      </p:sp>
-      <p:sp>
-        <p:nvSpPr>
-          <p:cNvPr id="22" name="PlaceHolder 4"/>
+            <a:endParaRPr b="0" lang="en-IN" sz="3200" spc="-1" strike="noStrike">
+              <a:latin typeface="Arial"/>
+            </a:endParaRPr>
+          </a:p>
+        </p:txBody>
+      </p:sp>
+      <p:sp>
+        <p:nvSpPr>
+          <p:cNvPr id="18" name="PlaceHolder 4"/>
           <p:cNvSpPr>
             <a:spLocks noGrp="1"/>
           </p:cNvSpPr>
@@ -1198,8 +1180,8 @@
         </p:nvSpPr>
         <p:spPr>
           <a:xfrm>
-            <a:off x="5152680" y="3085560"/>
-            <a:ext cx="4426920" cy="1568160"/>
+            <a:off x="5152680" y="3044520"/>
+            <a:ext cx="4426920" cy="1568520"/>
           </a:xfrm>
           <a:prstGeom prst="rect">
             <a:avLst/>
@@ -1210,7 +1192,7 @@
             <a:normAutofit/>
           </a:bodyPr>
           <a:p>
-            <a:endParaRPr b="0" lang="en-IN" sz="2600" spc="-1" strike="noStrike">
+            <a:endParaRPr b="0" lang="en-IN" sz="3200" spc="-1" strike="noStrike">
               <a:latin typeface="Arial"/>
             </a:endParaRPr>
           </a:p>
@@ -1240,7 +1222,7 @@
       </p:grpSpPr>
       <p:sp>
         <p:nvSpPr>
-          <p:cNvPr id="23" name="PlaceHolder 1"/>
+          <p:cNvPr id="19" name="PlaceHolder 1"/>
           <p:cNvSpPr>
             <a:spLocks noGrp="1"/>
           </p:cNvSpPr>
@@ -1251,7 +1233,7 @@
         <p:spPr>
           <a:xfrm>
             <a:off x="504000" y="216000"/>
-            <a:ext cx="7020000" cy="936000"/>
+            <a:ext cx="7019640" cy="935640"/>
           </a:xfrm>
           <a:prstGeom prst="rect">
             <a:avLst/>
@@ -1260,18 +1242,16 @@
         <p:txBody>
           <a:bodyPr lIns="0" rIns="0" tIns="0" bIns="0" anchor="ctr"/>
           <a:p>
-            <a:endParaRPr b="0" lang="en-IN" sz="3570" spc="-1" strike="noStrike">
-              <a:solidFill>
-                <a:srgbClr val="ffffff"/>
-              </a:solidFill>
-              <a:latin typeface="Arial"/>
-            </a:endParaRPr>
-          </a:p>
-        </p:txBody>
-      </p:sp>
-      <p:sp>
-        <p:nvSpPr>
-          <p:cNvPr id="24" name="PlaceHolder 2"/>
+            <a:pPr algn="ctr"/>
+            <a:endParaRPr b="0" lang="en-IN" sz="4400" spc="-1" strike="noStrike">
+              <a:latin typeface="Arial"/>
+            </a:endParaRPr>
+          </a:p>
+        </p:txBody>
+      </p:sp>
+      <p:sp>
+        <p:nvSpPr>
+          <p:cNvPr id="20" name="PlaceHolder 2"/>
           <p:cNvSpPr>
             <a:spLocks noGrp="1"/>
           </p:cNvSpPr>
@@ -1281,8 +1261,8 @@
         </p:nvSpPr>
         <p:spPr>
           <a:xfrm>
-            <a:off x="504000" y="1368000"/>
-            <a:ext cx="4426920" cy="1568160"/>
+            <a:off x="504000" y="1326600"/>
+            <a:ext cx="4426920" cy="1568520"/>
           </a:xfrm>
           <a:prstGeom prst="rect">
             <a:avLst/>
@@ -1293,15 +1273,15 @@
             <a:normAutofit/>
           </a:bodyPr>
           <a:p>
-            <a:endParaRPr b="0" lang="en-IN" sz="2600" spc="-1" strike="noStrike">
-              <a:latin typeface="Arial"/>
-            </a:endParaRPr>
-          </a:p>
-        </p:txBody>
-      </p:sp>
-      <p:sp>
-        <p:nvSpPr>
-          <p:cNvPr id="25" name="PlaceHolder 3"/>
+            <a:endParaRPr b="0" lang="en-IN" sz="3200" spc="-1" strike="noStrike">
+              <a:latin typeface="Arial"/>
+            </a:endParaRPr>
+          </a:p>
+        </p:txBody>
+      </p:sp>
+      <p:sp>
+        <p:nvSpPr>
+          <p:cNvPr id="21" name="PlaceHolder 3"/>
           <p:cNvSpPr>
             <a:spLocks noGrp="1"/>
           </p:cNvSpPr>
@@ -1311,8 +1291,8 @@
         </p:nvSpPr>
         <p:spPr>
           <a:xfrm>
-            <a:off x="5152680" y="1368000"/>
-            <a:ext cx="4426920" cy="1568160"/>
+            <a:off x="5152680" y="1326600"/>
+            <a:ext cx="4426920" cy="1568520"/>
           </a:xfrm>
           <a:prstGeom prst="rect">
             <a:avLst/>
@@ -1323,15 +1303,15 @@
             <a:normAutofit/>
           </a:bodyPr>
           <a:p>
-            <a:endParaRPr b="0" lang="en-IN" sz="2600" spc="-1" strike="noStrike">
-              <a:latin typeface="Arial"/>
-            </a:endParaRPr>
-          </a:p>
-        </p:txBody>
-      </p:sp>
-      <p:sp>
-        <p:nvSpPr>
-          <p:cNvPr id="26" name="PlaceHolder 4"/>
+            <a:endParaRPr b="0" lang="en-IN" sz="3200" spc="-1" strike="noStrike">
+              <a:latin typeface="Arial"/>
+            </a:endParaRPr>
+          </a:p>
+        </p:txBody>
+      </p:sp>
+      <p:sp>
+        <p:nvSpPr>
+          <p:cNvPr id="22" name="PlaceHolder 4"/>
           <p:cNvSpPr>
             <a:spLocks noGrp="1"/>
           </p:cNvSpPr>
@@ -1341,8 +1321,8 @@
         </p:nvSpPr>
         <p:spPr>
           <a:xfrm>
-            <a:off x="504000" y="3085560"/>
-            <a:ext cx="9072000" cy="1568160"/>
+            <a:off x="504000" y="3044520"/>
+            <a:ext cx="9072000" cy="1568520"/>
           </a:xfrm>
           <a:prstGeom prst="rect">
             <a:avLst/>
@@ -1353,7 +1333,7 @@
             <a:normAutofit/>
           </a:bodyPr>
           <a:p>
-            <a:endParaRPr b="0" lang="en-IN" sz="2600" spc="-1" strike="noStrike">
+            <a:endParaRPr b="0" lang="en-IN" sz="3200" spc="-1" strike="noStrike">
               <a:latin typeface="Arial"/>
             </a:endParaRPr>
           </a:p>
@@ -1394,7 +1374,7 @@
         <p:spPr>
           <a:xfrm>
             <a:off x="-58320" y="81000"/>
-            <a:ext cx="7794360" cy="1205640"/>
+            <a:ext cx="7794000" cy="1205280"/>
           </a:xfrm>
           <a:prstGeom prst="rect">
             <a:avLst/>
@@ -1417,7 +1397,7 @@
         <p:spPr>
           <a:xfrm>
             <a:off x="504000" y="216000"/>
-            <a:ext cx="7020000" cy="936000"/>
+            <a:ext cx="7019640" cy="935640"/>
           </a:xfrm>
           <a:prstGeom prst="rect">
             <a:avLst/>
@@ -1427,301 +1407,12 @@
           <a:bodyPr lIns="0" rIns="0" tIns="0" bIns="0" anchor="ctr"/>
           <a:p>
             <a:r>
-              <a:rPr b="0" lang="en-IN" sz="3570" spc="-1" strike="noStrike">
-                <a:solidFill>
-                  <a:srgbClr val="ffffff"/>
-                </a:solidFill>
+              <a:rPr b="0" lang="en-IN" sz="1800" spc="-1" strike="noStrike">
                 <a:latin typeface="Arial"/>
               </a:rPr>
               <a:t>Click to edit the title text format</a:t>
             </a:r>
-            <a:endParaRPr b="0" lang="en-IN" sz="3570" spc="-1" strike="noStrike">
-              <a:solidFill>
-                <a:srgbClr val="ffffff"/>
-              </a:solidFill>
-              <a:latin typeface="Arial"/>
-            </a:endParaRPr>
-          </a:p>
-        </p:txBody>
-      </p:sp>
-      <p:sp>
-        <p:nvSpPr>
-          <p:cNvPr id="2" name="PlaceHolder 2"/>
-          <p:cNvSpPr>
-            <a:spLocks noGrp="1"/>
-          </p:cNvSpPr>
-          <p:nvPr>
-            <p:ph type="body"/>
-          </p:nvPr>
-        </p:nvSpPr>
-        <p:spPr>
-          <a:xfrm>
-            <a:off x="504000" y="1368000"/>
-            <a:ext cx="9072000" cy="3288240"/>
-          </a:xfrm>
-          <a:prstGeom prst="rect">
-            <a:avLst/>
-          </a:prstGeom>
-        </p:spPr>
-        <p:txBody>
-          <a:bodyPr lIns="0" rIns="0" tIns="0" bIns="0">
-            <a:normAutofit/>
-          </a:bodyPr>
-          <a:p>
-            <a:pPr marL="432000" indent="-324000">
-              <a:spcAft>
-                <a:spcPts val="1148"/>
-              </a:spcAft>
-              <a:buClr>
-                <a:srgbClr val="000000"/>
-              </a:buClr>
-              <a:buSzPct val="45000"/>
-              <a:buFont typeface="Wingdings" charset="2"/>
-              <a:buChar char=""/>
-            </a:pPr>
-            <a:r>
-              <a:rPr b="0" lang="en-IN" sz="2600" spc="-1" strike="noStrike">
-                <a:latin typeface="Arial"/>
-              </a:rPr>
-              <a:t>Click to edit the outline text format</a:t>
-            </a:r>
-            <a:endParaRPr b="0" lang="en-IN" sz="2600" spc="-1" strike="noStrike">
-              <a:latin typeface="Arial"/>
-            </a:endParaRPr>
-          </a:p>
-          <a:p>
-            <a:pPr lvl="1" marL="864000" indent="-324000">
-              <a:spcAft>
-                <a:spcPts val="918"/>
-              </a:spcAft>
-              <a:buClr>
-                <a:srgbClr val="000000"/>
-              </a:buClr>
-              <a:buSzPct val="75000"/>
-              <a:buFont typeface="Symbol" charset="2"/>
-              <a:buChar char=""/>
-            </a:pPr>
-            <a:r>
-              <a:rPr b="0" lang="en-IN" sz="2280" spc="-1" strike="noStrike">
-                <a:latin typeface="Arial"/>
-              </a:rPr>
-              <a:t>Second Outline Level</a:t>
-            </a:r>
-            <a:endParaRPr b="0" lang="en-IN" sz="2280" spc="-1" strike="noStrike">
-              <a:latin typeface="Arial"/>
-            </a:endParaRPr>
-          </a:p>
-          <a:p>
-            <a:pPr lvl="2" marL="1296000" indent="-288000">
-              <a:spcAft>
-                <a:spcPts val="689"/>
-              </a:spcAft>
-              <a:buClr>
-                <a:srgbClr val="000000"/>
-              </a:buClr>
-              <a:buSzPct val="45000"/>
-              <a:buFont typeface="Wingdings" charset="2"/>
-              <a:buChar char=""/>
-            </a:pPr>
-            <a:r>
-              <a:rPr b="0" lang="en-IN" sz="1950" spc="-1" strike="noStrike">
-                <a:latin typeface="Arial"/>
-              </a:rPr>
-              <a:t>Third Outline Level</a:t>
-            </a:r>
-            <a:endParaRPr b="0" lang="en-IN" sz="1950" spc="-1" strike="noStrike">
-              <a:latin typeface="Arial"/>
-            </a:endParaRPr>
-          </a:p>
-          <a:p>
-            <a:pPr lvl="3" marL="1728000" indent="-216000">
-              <a:spcAft>
-                <a:spcPts val="459"/>
-              </a:spcAft>
-              <a:buClr>
-                <a:srgbClr val="000000"/>
-              </a:buClr>
-              <a:buSzPct val="75000"/>
-              <a:buFont typeface="Symbol" charset="2"/>
-              <a:buChar char=""/>
-            </a:pPr>
-            <a:r>
-              <a:rPr b="0" lang="en-IN" sz="1629" spc="-1" strike="noStrike">
-                <a:latin typeface="Arial"/>
-              </a:rPr>
-              <a:t>Fourth Outline Level</a:t>
-            </a:r>
-            <a:endParaRPr b="0" lang="en-IN" sz="1629" spc="-1" strike="noStrike">
-              <a:latin typeface="Arial"/>
-            </a:endParaRPr>
-          </a:p>
-          <a:p>
-            <a:pPr lvl="4" marL="2160000" indent="-216000">
-              <a:spcAft>
-                <a:spcPts val="230"/>
-              </a:spcAft>
-              <a:buClr>
-                <a:srgbClr val="000000"/>
-              </a:buClr>
-              <a:buSzPct val="45000"/>
-              <a:buFont typeface="Wingdings" charset="2"/>
-              <a:buChar char=""/>
-            </a:pPr>
-            <a:r>
-              <a:rPr b="0" lang="en-IN" sz="1629" spc="-1" strike="noStrike">
-                <a:latin typeface="Arial"/>
-              </a:rPr>
-              <a:t>Fifth Outline Level</a:t>
-            </a:r>
-            <a:endParaRPr b="0" lang="en-IN" sz="1629" spc="-1" strike="noStrike">
-              <a:latin typeface="Arial"/>
-            </a:endParaRPr>
-          </a:p>
-          <a:p>
-            <a:pPr lvl="5" marL="2592000" indent="-216000">
-              <a:spcAft>
-                <a:spcPts val="230"/>
-              </a:spcAft>
-              <a:buClr>
-                <a:srgbClr val="000000"/>
-              </a:buClr>
-              <a:buSzPct val="45000"/>
-              <a:buFont typeface="Wingdings" charset="2"/>
-              <a:buChar char=""/>
-            </a:pPr>
-            <a:r>
-              <a:rPr b="0" lang="en-IN" sz="1629" spc="-1" strike="noStrike">
-                <a:latin typeface="Arial"/>
-              </a:rPr>
-              <a:t>Sixth Outline Level</a:t>
-            </a:r>
-            <a:endParaRPr b="0" lang="en-IN" sz="1629" spc="-1" strike="noStrike">
-              <a:latin typeface="Arial"/>
-            </a:endParaRPr>
-          </a:p>
-          <a:p>
-            <a:pPr lvl="6" marL="3024000" indent="-216000">
-              <a:spcAft>
-                <a:spcPts val="230"/>
-              </a:spcAft>
-              <a:buClr>
-                <a:srgbClr val="000000"/>
-              </a:buClr>
-              <a:buSzPct val="45000"/>
-              <a:buFont typeface="Wingdings" charset="2"/>
-              <a:buChar char=""/>
-            </a:pPr>
-            <a:r>
-              <a:rPr b="0" lang="en-IN" sz="1629" spc="-1" strike="noStrike">
-                <a:latin typeface="Arial"/>
-              </a:rPr>
-              <a:t>Seventh Outline Level</a:t>
-            </a:r>
-            <a:endParaRPr b="0" lang="en-IN" sz="1629" spc="-1" strike="noStrike">
-              <a:latin typeface="Arial"/>
-            </a:endParaRPr>
-          </a:p>
-        </p:txBody>
-      </p:sp>
-      <p:sp>
-        <p:nvSpPr>
-          <p:cNvPr id="3" name="PlaceHolder 3"/>
-          <p:cNvSpPr>
-            <a:spLocks noGrp="1"/>
-          </p:cNvSpPr>
-          <p:nvPr>
-            <p:ph type="dt"/>
-          </p:nvPr>
-        </p:nvSpPr>
-        <p:spPr>
-          <a:xfrm>
-            <a:off x="504000" y="5164920"/>
-            <a:ext cx="2348280" cy="390600"/>
-          </a:xfrm>
-          <a:prstGeom prst="rect">
-            <a:avLst/>
-          </a:prstGeom>
-        </p:spPr>
-        <p:txBody>
-          <a:bodyPr lIns="0" rIns="0" tIns="0" bIns="0"/>
-          <a:p>
-            <a:r>
-              <a:rPr b="0" lang="en-IN" sz="1400" spc="-1" strike="noStrike">
-                <a:latin typeface="Arial"/>
-              </a:rPr>
-              <a:t>&lt;date/time&gt;</a:t>
-            </a:r>
-            <a:endParaRPr b="0" lang="en-IN" sz="1400" spc="-1" strike="noStrike">
-              <a:latin typeface="Arial"/>
-            </a:endParaRPr>
-          </a:p>
-        </p:txBody>
-      </p:sp>
-      <p:sp>
-        <p:nvSpPr>
-          <p:cNvPr id="4" name="PlaceHolder 4"/>
-          <p:cNvSpPr>
-            <a:spLocks noGrp="1"/>
-          </p:cNvSpPr>
-          <p:nvPr>
-            <p:ph type="ftr"/>
-          </p:nvPr>
-        </p:nvSpPr>
-        <p:spPr>
-          <a:xfrm>
-            <a:off x="3447000" y="5164920"/>
-            <a:ext cx="3195000" cy="390600"/>
-          </a:xfrm>
-          <a:prstGeom prst="rect">
-            <a:avLst/>
-          </a:prstGeom>
-        </p:spPr>
-        <p:txBody>
-          <a:bodyPr lIns="0" rIns="0" tIns="0" bIns="0"/>
-          <a:p>
-            <a:pPr algn="ctr"/>
-            <a:r>
-              <a:rPr b="0" lang="en-IN" sz="1400" spc="-1" strike="noStrike">
-                <a:latin typeface="Arial"/>
-              </a:rPr>
-              <a:t>&lt;footer&gt;</a:t>
-            </a:r>
-            <a:endParaRPr b="0" lang="en-IN" sz="1400" spc="-1" strike="noStrike">
-              <a:latin typeface="Arial"/>
-            </a:endParaRPr>
-          </a:p>
-        </p:txBody>
-      </p:sp>
-      <p:sp>
-        <p:nvSpPr>
-          <p:cNvPr id="5" name="PlaceHolder 5"/>
-          <p:cNvSpPr>
-            <a:spLocks noGrp="1"/>
-          </p:cNvSpPr>
-          <p:nvPr>
-            <p:ph type="sldNum"/>
-          </p:nvPr>
-        </p:nvSpPr>
-        <p:spPr>
-          <a:xfrm>
-            <a:off x="7227000" y="5164920"/>
-            <a:ext cx="2348280" cy="390600"/>
-          </a:xfrm>
-          <a:prstGeom prst="rect">
-            <a:avLst/>
-          </a:prstGeom>
-        </p:spPr>
-        <p:txBody>
-          <a:bodyPr lIns="0" rIns="0" tIns="0" bIns="0"/>
-          <a:p>
-            <a:pPr algn="r"/>
-            <a:fld id="{767718A0-29AE-4010-8C1B-0FD963EEAB74}" type="slidenum">
-              <a:rPr b="0" lang="en-IN" sz="1400" spc="-1" strike="noStrike">
-                <a:latin typeface="Arial"/>
-              </a:rPr>
-              <a:t>&lt;number&gt;</a:t>
-            </a:fld>
-            <a:endParaRPr b="0" lang="en-IN" sz="1400" spc="-1" strike="noStrike">
+            <a:endParaRPr b="0" lang="en-IN" sz="1800" spc="-1" strike="noStrike">
               <a:latin typeface="Arial"/>
             </a:endParaRPr>
           </a:p>
@@ -1766,14 +1457,14 @@
       </p:grpSpPr>
       <p:sp>
         <p:nvSpPr>
-          <p:cNvPr id="42" name="TextShape 1"/>
-          <p:cNvSpPr txBox="1"/>
+          <p:cNvPr id="38" name="CustomShape 1"/>
+          <p:cNvSpPr/>
           <p:nvPr/>
         </p:nvSpPr>
         <p:spPr>
           <a:xfrm>
             <a:off x="504000" y="216000"/>
-            <a:ext cx="7020000" cy="936000"/>
+            <a:ext cx="7019640" cy="935640"/>
           </a:xfrm>
           <a:prstGeom prst="rect">
             <a:avLst/>
@@ -1783,9 +1474,20 @@
             <a:noFill/>
           </a:ln>
         </p:spPr>
+        <p:style>
+          <a:lnRef idx="0"/>
+          <a:fillRef idx="0"/>
+          <a:effectRef idx="0"/>
+          <a:fontRef idx="minor"/>
+        </p:style>
         <p:txBody>
           <a:bodyPr lIns="0" rIns="0" tIns="0" bIns="0" anchor="ctr"/>
           <a:p>
+            <a:pPr>
+              <a:lnSpc>
+                <a:spcPct val="100000"/>
+              </a:lnSpc>
+            </a:pPr>
             <a:r>
               <a:rPr b="0" lang="en-IN" sz="3570" spc="-1" strike="noStrike">
                 <a:solidFill>
@@ -1796,24 +1498,21 @@
               <a:t>Micro Service example flow</a:t>
             </a:r>
             <a:endParaRPr b="0" lang="en-IN" sz="3570" spc="-1" strike="noStrike">
-              <a:solidFill>
-                <a:srgbClr val="ffffff"/>
-              </a:solidFill>
-              <a:latin typeface="Arial"/>
-            </a:endParaRPr>
-          </a:p>
-        </p:txBody>
-      </p:sp>
-      <p:sp>
-        <p:nvSpPr>
-          <p:cNvPr id="43" name="CustomShape 2"/>
+              <a:latin typeface="Arial"/>
+            </a:endParaRPr>
+          </a:p>
+        </p:txBody>
+      </p:sp>
+      <p:sp>
+        <p:nvSpPr>
+          <p:cNvPr id="39" name="CustomShape 2"/>
           <p:cNvSpPr/>
           <p:nvPr/>
         </p:nvSpPr>
         <p:spPr>
           <a:xfrm>
             <a:off x="6552000" y="2304000"/>
-            <a:ext cx="1080000" cy="720000"/>
+            <a:ext cx="1079640" cy="719640"/>
           </a:xfrm>
           <a:prstGeom prst="flowChartProcess">
             <a:avLst/>
@@ -1836,10 +1535,18 @@
         <p:txBody>
           <a:bodyPr wrap="none" lIns="90000" rIns="90000" tIns="45000" bIns="45000" anchor="ctr"/>
           <a:p>
-            <a:pPr algn="ctr"/>
+            <a:pPr algn="ctr">
+              <a:lnSpc>
+                <a:spcPct val="100000"/>
+              </a:lnSpc>
+            </a:pPr>
             <a:r>
               <a:rPr b="0" lang="en-IN" sz="1400" spc="-1" strike="noStrike">
-                <a:latin typeface="Arial"/>
+                <a:solidFill>
+                  <a:srgbClr val="000000"/>
+                </a:solidFill>
+                <a:latin typeface="Arial"/>
+                <a:ea typeface="DejaVu Sans"/>
               </a:rPr>
               <a:t>DB Service</a:t>
             </a:r>
@@ -1848,10 +1555,18 @@
             </a:endParaRPr>
           </a:p>
           <a:p>
-            <a:pPr algn="ctr"/>
+            <a:pPr algn="ctr">
+              <a:lnSpc>
+                <a:spcPct val="100000"/>
+              </a:lnSpc>
+            </a:pPr>
             <a:r>
               <a:rPr b="0" lang="en-IN" sz="900" spc="-1" strike="noStrike">
-                <a:latin typeface="Arial"/>
+                <a:solidFill>
+                  <a:srgbClr val="000000"/>
+                </a:solidFill>
+                <a:latin typeface="Arial"/>
+                <a:ea typeface="DejaVu Sans"/>
               </a:rPr>
               <a:t>(Internal Service, </a:t>
             </a:r>
@@ -1860,10 +1575,18 @@
             </a:endParaRPr>
           </a:p>
           <a:p>
-            <a:pPr algn="ctr"/>
+            <a:pPr algn="ctr">
+              <a:lnSpc>
+                <a:spcPct val="100000"/>
+              </a:lnSpc>
+            </a:pPr>
             <a:r>
               <a:rPr b="0" lang="en-IN" sz="900" spc="-1" strike="noStrike">
-                <a:latin typeface="Arial"/>
+                <a:solidFill>
+                  <a:srgbClr val="000000"/>
+                </a:solidFill>
+                <a:latin typeface="Arial"/>
+                <a:ea typeface="DejaVu Sans"/>
               </a:rPr>
               <a:t>not accessible </a:t>
             </a:r>
@@ -1872,10 +1595,18 @@
             </a:endParaRPr>
           </a:p>
           <a:p>
-            <a:pPr algn="ctr"/>
+            <a:pPr algn="ctr">
+              <a:lnSpc>
+                <a:spcPct val="100000"/>
+              </a:lnSpc>
+            </a:pPr>
             <a:r>
               <a:rPr b="0" lang="en-IN" sz="900" spc="-1" strike="noStrike">
-                <a:latin typeface="Arial"/>
+                <a:solidFill>
+                  <a:srgbClr val="000000"/>
+                </a:solidFill>
+                <a:latin typeface="Arial"/>
+                <a:ea typeface="DejaVu Sans"/>
               </a:rPr>
               <a:t>from outside network)</a:t>
             </a:r>
@@ -1887,14 +1618,14 @@
       </p:sp>
       <p:sp>
         <p:nvSpPr>
-          <p:cNvPr id="44" name="CustomShape 3"/>
+          <p:cNvPr id="40" name="CustomShape 3"/>
           <p:cNvSpPr/>
           <p:nvPr/>
         </p:nvSpPr>
         <p:spPr>
           <a:xfrm>
-            <a:off x="4752000" y="2304000"/>
-            <a:ext cx="1080000" cy="648000"/>
+            <a:off x="4770000" y="2448000"/>
+            <a:ext cx="1080000" cy="432000"/>
           </a:xfrm>
           <a:prstGeom prst="flowChartProcess">
             <a:avLst/>
@@ -1917,10 +1648,18 @@
         <p:txBody>
           <a:bodyPr wrap="none" lIns="90000" rIns="90000" tIns="45000" bIns="45000" anchor="ctr"/>
           <a:p>
-            <a:pPr algn="ctr"/>
+            <a:pPr algn="ctr">
+              <a:lnSpc>
+                <a:spcPct val="100000"/>
+              </a:lnSpc>
+            </a:pPr>
             <a:r>
               <a:rPr b="0" lang="en-IN" sz="1200" spc="-1" strike="noStrike">
-                <a:latin typeface="Arial"/>
+                <a:solidFill>
+                  <a:srgbClr val="000000"/>
+                </a:solidFill>
+                <a:latin typeface="Arial"/>
+                <a:ea typeface="DejaVu Sans"/>
               </a:rPr>
               <a:t>StudentService</a:t>
             </a:r>
@@ -1929,10 +1668,18 @@
             </a:endParaRPr>
           </a:p>
           <a:p>
-            <a:pPr algn="ctr"/>
+            <a:pPr algn="ctr">
+              <a:lnSpc>
+                <a:spcPct val="100000"/>
+              </a:lnSpc>
+            </a:pPr>
             <a:r>
               <a:rPr b="0" lang="en-IN" sz="900" spc="-1" strike="noStrike">
-                <a:latin typeface="Arial"/>
+                <a:solidFill>
+                  <a:srgbClr val="000000"/>
+                </a:solidFill>
+                <a:latin typeface="Arial"/>
+                <a:ea typeface="DejaVu Sans"/>
               </a:rPr>
               <a:t>(Exposed Service)</a:t>
             </a:r>
@@ -1940,18 +1687,38 @@
               <a:latin typeface="Arial"/>
             </a:endParaRPr>
           </a:p>
-        </p:txBody>
-      </p:sp>
-      <p:sp>
-        <p:nvSpPr>
-          <p:cNvPr id="45" name="CustomShape 4"/>
+          <a:p>
+            <a:pPr algn="ctr">
+              <a:lnSpc>
+                <a:spcPct val="100000"/>
+              </a:lnSpc>
+            </a:pPr>
+            <a:r>
+              <a:rPr b="0" lang="en-IN" sz="900" spc="-1" strike="noStrike">
+                <a:solidFill>
+                  <a:srgbClr val="000000"/>
+                </a:solidFill>
+                <a:latin typeface="Arial"/>
+                <a:ea typeface="DejaVu Sans"/>
+              </a:rPr>
+              <a:t>8082</a:t>
+            </a:r>
+            <a:endParaRPr b="0" lang="en-IN" sz="900" spc="-1" strike="noStrike">
+              <a:latin typeface="Arial"/>
+            </a:endParaRPr>
+          </a:p>
+        </p:txBody>
+      </p:sp>
+      <p:sp>
+        <p:nvSpPr>
+          <p:cNvPr id="41" name="CustomShape 4"/>
           <p:cNvSpPr/>
           <p:nvPr/>
         </p:nvSpPr>
         <p:spPr>
           <a:xfrm>
             <a:off x="3024000" y="3240000"/>
-            <a:ext cx="1080000" cy="1152000"/>
+            <a:ext cx="1079640" cy="1151640"/>
           </a:xfrm>
           <a:prstGeom prst="flowChartProcess">
             <a:avLst/>
@@ -1974,10 +1741,18 @@
         <p:txBody>
           <a:bodyPr wrap="none" lIns="90000" rIns="90000" tIns="45000" bIns="45000" anchor="ctr"/>
           <a:p>
-            <a:pPr algn="ctr"/>
+            <a:pPr algn="ctr">
+              <a:lnSpc>
+                <a:spcPct val="100000"/>
+              </a:lnSpc>
+            </a:pPr>
             <a:r>
               <a:rPr b="0" lang="en-IN" sz="1400" spc="-1" strike="noStrike">
-                <a:latin typeface="Arial"/>
+                <a:solidFill>
+                  <a:srgbClr val="000000"/>
+                </a:solidFill>
+                <a:latin typeface="Arial"/>
+                <a:ea typeface="DejaVu Sans"/>
               </a:rPr>
               <a:t>Eureka</a:t>
             </a:r>
@@ -1986,10 +1761,18 @@
             </a:endParaRPr>
           </a:p>
           <a:p>
-            <a:pPr algn="ctr"/>
+            <a:pPr algn="ctr">
+              <a:lnSpc>
+                <a:spcPct val="100000"/>
+              </a:lnSpc>
+            </a:pPr>
             <a:r>
               <a:rPr b="0" lang="en-IN" sz="900" spc="-1" strike="noStrike">
-                <a:latin typeface="Arial"/>
+                <a:solidFill>
+                  <a:srgbClr val="000000"/>
+                </a:solidFill>
+                <a:latin typeface="Arial"/>
+                <a:ea typeface="DejaVu Sans"/>
               </a:rPr>
               <a:t>(Service Registry)</a:t>
             </a:r>
@@ -1998,9 +1781,18 @@
             </a:endParaRPr>
           </a:p>
           <a:p>
+            <a:pPr>
+              <a:lnSpc>
+                <a:spcPct val="100000"/>
+              </a:lnSpc>
+            </a:pPr>
             <a:r>
               <a:rPr b="0" lang="en-IN" sz="900" spc="-1" strike="noStrike">
-                <a:latin typeface="Arial"/>
+                <a:solidFill>
+                  <a:srgbClr val="000000"/>
+                </a:solidFill>
+                <a:latin typeface="Arial"/>
+                <a:ea typeface="DejaVu Sans"/>
               </a:rPr>
               <a:t>1. course-service</a:t>
             </a:r>
@@ -2009,9 +1801,18 @@
             </a:endParaRPr>
           </a:p>
           <a:p>
+            <a:pPr>
+              <a:lnSpc>
+                <a:spcPct val="100000"/>
+              </a:lnSpc>
+            </a:pPr>
             <a:r>
               <a:rPr b="0" lang="en-IN" sz="900" spc="-1" strike="noStrike">
-                <a:latin typeface="Arial"/>
+                <a:solidFill>
+                  <a:srgbClr val="000000"/>
+                </a:solidFill>
+                <a:latin typeface="Arial"/>
+                <a:ea typeface="DejaVu Sans"/>
               </a:rPr>
               <a:t>2. student-service</a:t>
             </a:r>
@@ -2020,9 +1821,18 @@
             </a:endParaRPr>
           </a:p>
           <a:p>
+            <a:pPr>
+              <a:lnSpc>
+                <a:spcPct val="100000"/>
+              </a:lnSpc>
+            </a:pPr>
             <a:r>
               <a:rPr b="0" lang="en-IN" sz="900" spc="-1" strike="noStrike">
-                <a:latin typeface="Arial"/>
+                <a:solidFill>
+                  <a:srgbClr val="000000"/>
+                </a:solidFill>
+                <a:latin typeface="Arial"/>
+                <a:ea typeface="DejaVu Sans"/>
               </a:rPr>
               <a:t>3. regn-service</a:t>
             </a:r>
@@ -2031,9 +1841,18 @@
             </a:endParaRPr>
           </a:p>
           <a:p>
+            <a:pPr>
+              <a:lnSpc>
+                <a:spcPct val="100000"/>
+              </a:lnSpc>
+            </a:pPr>
             <a:r>
               <a:rPr b="0" lang="en-IN" sz="900" spc="-1" strike="noStrike">
-                <a:latin typeface="Arial"/>
+                <a:solidFill>
+                  <a:srgbClr val="000000"/>
+                </a:solidFill>
+                <a:latin typeface="Arial"/>
+                <a:ea typeface="DejaVu Sans"/>
               </a:rPr>
               <a:t>4. db-service</a:t>
             </a:r>
@@ -2045,14 +1864,14 @@
       </p:sp>
       <p:sp>
         <p:nvSpPr>
-          <p:cNvPr id="46" name="CustomShape 5"/>
+          <p:cNvPr id="42" name="CustomShape 5"/>
           <p:cNvSpPr/>
           <p:nvPr/>
         </p:nvSpPr>
         <p:spPr>
           <a:xfrm>
             <a:off x="1800000" y="2304000"/>
-            <a:ext cx="1080000" cy="576000"/>
+            <a:ext cx="1079640" cy="575640"/>
           </a:xfrm>
           <a:prstGeom prst="flowChartProcess">
             <a:avLst/>
@@ -2075,10 +1894,18 @@
         <p:txBody>
           <a:bodyPr wrap="none" lIns="90000" rIns="90000" tIns="45000" bIns="45000" anchor="ctr"/>
           <a:p>
-            <a:pPr algn="ctr"/>
+            <a:pPr algn="ctr">
+              <a:lnSpc>
+                <a:spcPct val="100000"/>
+              </a:lnSpc>
+            </a:pPr>
             <a:r>
               <a:rPr b="0" lang="en-IN" sz="1400" spc="-1" strike="noStrike">
-                <a:latin typeface="Arial"/>
+                <a:solidFill>
+                  <a:srgbClr val="000000"/>
+                </a:solidFill>
+                <a:latin typeface="Arial"/>
+                <a:ea typeface="DejaVu Sans"/>
               </a:rPr>
               <a:t>Zuul</a:t>
             </a:r>
@@ -2087,10 +1914,18 @@
             </a:endParaRPr>
           </a:p>
           <a:p>
-            <a:pPr algn="ctr"/>
+            <a:pPr algn="ctr">
+              <a:lnSpc>
+                <a:spcPct val="100000"/>
+              </a:lnSpc>
+            </a:pPr>
             <a:r>
               <a:rPr b="0" lang="en-IN" sz="900" spc="-1" strike="noStrike">
-                <a:latin typeface="Arial"/>
+                <a:solidFill>
+                  <a:srgbClr val="000000"/>
+                </a:solidFill>
+                <a:latin typeface="Arial"/>
+                <a:ea typeface="DejaVu Sans"/>
               </a:rPr>
               <a:t>(api-gateway)</a:t>
             </a:r>
@@ -2102,14 +1937,14 @@
       </p:sp>
       <p:sp>
         <p:nvSpPr>
-          <p:cNvPr id="47" name="CustomShape 6"/>
+          <p:cNvPr id="43" name="CustomShape 6"/>
           <p:cNvSpPr/>
           <p:nvPr/>
         </p:nvSpPr>
         <p:spPr>
           <a:xfrm>
             <a:off x="3168000" y="2304000"/>
-            <a:ext cx="1080000" cy="504000"/>
+            <a:ext cx="1079640" cy="503640"/>
           </a:xfrm>
           <a:prstGeom prst="flowChartProcess">
             <a:avLst/>
@@ -2132,10 +1967,18 @@
         <p:txBody>
           <a:bodyPr wrap="none" lIns="90000" rIns="90000" tIns="45000" bIns="45000" anchor="ctr"/>
           <a:p>
-            <a:pPr algn="ctr"/>
+            <a:pPr algn="ctr">
+              <a:lnSpc>
+                <a:spcPct val="100000"/>
+              </a:lnSpc>
+            </a:pPr>
             <a:r>
               <a:rPr b="0" lang="en-IN" sz="1400" spc="-1" strike="noStrike">
-                <a:latin typeface="Arial"/>
+                <a:solidFill>
+                  <a:srgbClr val="000000"/>
+                </a:solidFill>
+                <a:latin typeface="Arial"/>
+                <a:ea typeface="DejaVu Sans"/>
               </a:rPr>
               <a:t>Ribbon</a:t>
             </a:r>
@@ -2144,10 +1987,18 @@
             </a:endParaRPr>
           </a:p>
           <a:p>
-            <a:pPr algn="ctr"/>
+            <a:pPr algn="ctr">
+              <a:lnSpc>
+                <a:spcPct val="100000"/>
+              </a:lnSpc>
+            </a:pPr>
             <a:r>
               <a:rPr b="0" lang="en-IN" sz="900" spc="-1" strike="noStrike">
-                <a:latin typeface="Arial"/>
+                <a:solidFill>
+                  <a:srgbClr val="000000"/>
+                </a:solidFill>
+                <a:latin typeface="Arial"/>
+                <a:ea typeface="DejaVu Sans"/>
               </a:rPr>
               <a:t>(load balancer)</a:t>
             </a:r>
@@ -2159,7 +2010,7 @@
       </p:sp>
       <p:pic>
         <p:nvPicPr>
-          <p:cNvPr id="48" name="" descr=""/>
+          <p:cNvPr id="44" name="" descr=""/>
           <p:cNvPicPr/>
           <p:nvPr/>
         </p:nvPicPr>
@@ -2170,7 +2021,7 @@
         <p:spPr>
           <a:xfrm>
             <a:off x="144000" y="2088000"/>
-            <a:ext cx="1078560" cy="1078560"/>
+            <a:ext cx="1078200" cy="1078200"/>
           </a:xfrm>
           <a:prstGeom prst="rect">
             <a:avLst/>
@@ -2182,14 +2033,14 @@
       </p:pic>
       <p:sp>
         <p:nvSpPr>
-          <p:cNvPr id="49" name="CustomShape 7"/>
+          <p:cNvPr id="45" name="CustomShape 7"/>
           <p:cNvSpPr/>
           <p:nvPr/>
         </p:nvSpPr>
         <p:spPr>
           <a:xfrm>
             <a:off x="4752000" y="3240000"/>
-            <a:ext cx="1080000" cy="648000"/>
+            <a:ext cx="1079640" cy="647640"/>
           </a:xfrm>
           <a:prstGeom prst="flowChartProcess">
             <a:avLst/>
@@ -2212,10 +2063,18 @@
         <p:txBody>
           <a:bodyPr wrap="none" lIns="90000" rIns="90000" tIns="45000" bIns="45000" anchor="ctr"/>
           <a:p>
-            <a:pPr algn="ctr"/>
+            <a:pPr algn="ctr">
+              <a:lnSpc>
+                <a:spcPct val="100000"/>
+              </a:lnSpc>
+            </a:pPr>
             <a:r>
               <a:rPr b="0" lang="en-IN" sz="1200" spc="-1" strike="noStrike">
-                <a:latin typeface="Arial"/>
+                <a:solidFill>
+                  <a:srgbClr val="000000"/>
+                </a:solidFill>
+                <a:latin typeface="Arial"/>
+                <a:ea typeface="DejaVu Sans"/>
               </a:rPr>
               <a:t>Registration</a:t>
             </a:r>
@@ -2224,10 +2083,18 @@
             </a:endParaRPr>
           </a:p>
           <a:p>
-            <a:pPr algn="ctr"/>
+            <a:pPr algn="ctr">
+              <a:lnSpc>
+                <a:spcPct val="100000"/>
+              </a:lnSpc>
+            </a:pPr>
             <a:r>
               <a:rPr b="0" lang="en-IN" sz="1200" spc="-1" strike="noStrike">
-                <a:latin typeface="Arial"/>
+                <a:solidFill>
+                  <a:srgbClr val="000000"/>
+                </a:solidFill>
+                <a:latin typeface="Arial"/>
+                <a:ea typeface="DejaVu Sans"/>
               </a:rPr>
               <a:t>Service</a:t>
             </a:r>
@@ -2236,10 +2103,18 @@
             </a:endParaRPr>
           </a:p>
           <a:p>
-            <a:pPr algn="ctr"/>
+            <a:pPr algn="ctr">
+              <a:lnSpc>
+                <a:spcPct val="100000"/>
+              </a:lnSpc>
+            </a:pPr>
             <a:r>
               <a:rPr b="0" lang="en-IN" sz="900" spc="-1" strike="noStrike">
-                <a:latin typeface="Arial"/>
+                <a:solidFill>
+                  <a:srgbClr val="000000"/>
+                </a:solidFill>
+                <a:latin typeface="Arial"/>
+                <a:ea typeface="DejaVu Sans"/>
               </a:rPr>
               <a:t>(Exposed Service)</a:t>
             </a:r>
@@ -2251,14 +2126,14 @@
       </p:sp>
       <p:sp>
         <p:nvSpPr>
-          <p:cNvPr id="50" name="CustomShape 8"/>
+          <p:cNvPr id="46" name="CustomShape 8"/>
           <p:cNvSpPr/>
           <p:nvPr/>
         </p:nvSpPr>
         <p:spPr>
           <a:xfrm>
             <a:off x="4752000" y="1368000"/>
-            <a:ext cx="1080000" cy="648000"/>
+            <a:ext cx="1079640" cy="647640"/>
           </a:xfrm>
           <a:prstGeom prst="flowChartProcess">
             <a:avLst/>
@@ -2281,10 +2156,18 @@
         <p:txBody>
           <a:bodyPr wrap="none" lIns="90000" rIns="90000" tIns="45000" bIns="45000" anchor="ctr"/>
           <a:p>
-            <a:pPr algn="ctr"/>
+            <a:pPr algn="ctr">
+              <a:lnSpc>
+                <a:spcPct val="100000"/>
+              </a:lnSpc>
+            </a:pPr>
             <a:r>
               <a:rPr b="0" lang="en-IN" sz="1200" spc="-1" strike="noStrike">
-                <a:latin typeface="Arial"/>
+                <a:solidFill>
+                  <a:srgbClr val="000000"/>
+                </a:solidFill>
+                <a:latin typeface="Arial"/>
+                <a:ea typeface="DejaVu Sans"/>
               </a:rPr>
               <a:t>CourseService</a:t>
             </a:r>
@@ -2293,10 +2176,18 @@
             </a:endParaRPr>
           </a:p>
           <a:p>
-            <a:pPr algn="ctr"/>
+            <a:pPr algn="ctr">
+              <a:lnSpc>
+                <a:spcPct val="100000"/>
+              </a:lnSpc>
+            </a:pPr>
             <a:r>
               <a:rPr b="0" lang="en-IN" sz="900" spc="-1" strike="noStrike">
-                <a:latin typeface="Arial"/>
+                <a:solidFill>
+                  <a:srgbClr val="000000"/>
+                </a:solidFill>
+                <a:latin typeface="Arial"/>
+                <a:ea typeface="DejaVu Sans"/>
               </a:rPr>
               <a:t>(Exposed Service)</a:t>
             </a:r>
@@ -2308,14 +2199,14 @@
       </p:sp>
       <p:sp>
         <p:nvSpPr>
-          <p:cNvPr id="51" name="Line 9"/>
+          <p:cNvPr id="47" name="Line 9"/>
           <p:cNvSpPr/>
           <p:nvPr/>
         </p:nvSpPr>
         <p:spPr>
           <a:xfrm>
             <a:off x="1152000" y="2592000"/>
-            <a:ext cx="648000" cy="0"/>
+            <a:ext cx="648000" cy="360"/>
           </a:xfrm>
           <a:prstGeom prst="line">
             <a:avLst/>
@@ -2336,14 +2227,14 @@
       </p:sp>
       <p:sp>
         <p:nvSpPr>
-          <p:cNvPr id="52" name="Line 10"/>
+          <p:cNvPr id="48" name="Line 10"/>
           <p:cNvSpPr/>
           <p:nvPr/>
         </p:nvSpPr>
         <p:spPr>
           <a:xfrm>
             <a:off x="2880000" y="2592000"/>
-            <a:ext cx="288000" cy="0"/>
+            <a:ext cx="288000" cy="360"/>
           </a:xfrm>
           <a:prstGeom prst="line">
             <a:avLst/>
@@ -2363,14 +2254,14 @@
       </p:sp>
       <p:sp>
         <p:nvSpPr>
-          <p:cNvPr id="53" name="Line 11"/>
+          <p:cNvPr id="49" name="Line 11"/>
           <p:cNvSpPr/>
           <p:nvPr/>
         </p:nvSpPr>
         <p:spPr>
           <a:xfrm>
             <a:off x="4104000" y="2592000"/>
-            <a:ext cx="648000" cy="0"/>
+            <a:ext cx="648000" cy="360"/>
           </a:xfrm>
           <a:prstGeom prst="line">
             <a:avLst/>
@@ -2390,7 +2281,7 @@
       </p:sp>
       <p:sp>
         <p:nvSpPr>
-          <p:cNvPr id="54" name="Line 12"/>
+          <p:cNvPr id="50" name="Line 12"/>
           <p:cNvSpPr/>
           <p:nvPr/>
         </p:nvSpPr>
@@ -2417,7 +2308,7 @@
       </p:sp>
       <p:sp>
         <p:nvSpPr>
-          <p:cNvPr id="55" name="Line 13"/>
+          <p:cNvPr id="51" name="Line 13"/>
           <p:cNvSpPr/>
           <p:nvPr/>
         </p:nvSpPr>
@@ -2444,14 +2335,14 @@
       </p:sp>
       <p:sp>
         <p:nvSpPr>
-          <p:cNvPr id="56" name="Line 14"/>
+          <p:cNvPr id="52" name="Line 14"/>
           <p:cNvSpPr/>
           <p:nvPr/>
         </p:nvSpPr>
         <p:spPr>
           <a:xfrm>
             <a:off x="5832000" y="2664000"/>
-            <a:ext cx="720000" cy="0"/>
+            <a:ext cx="720000" cy="360"/>
           </a:xfrm>
           <a:prstGeom prst="line">
             <a:avLst/>
@@ -2471,14 +2362,14 @@
       </p:sp>
       <p:sp>
         <p:nvSpPr>
-          <p:cNvPr id="57" name="Line 15"/>
+          <p:cNvPr id="53" name="Line 15"/>
           <p:cNvSpPr/>
           <p:nvPr/>
         </p:nvSpPr>
         <p:spPr>
           <a:xfrm>
             <a:off x="7632000" y="2664000"/>
-            <a:ext cx="936000" cy="0"/>
+            <a:ext cx="936000" cy="360"/>
           </a:xfrm>
           <a:prstGeom prst="line">
             <a:avLst/>
@@ -2498,14 +2389,14 @@
       </p:sp>
       <p:sp>
         <p:nvSpPr>
-          <p:cNvPr id="58" name="CustomShape 16"/>
+          <p:cNvPr id="54" name="CustomShape 16"/>
           <p:cNvSpPr/>
           <p:nvPr/>
         </p:nvSpPr>
         <p:spPr>
           <a:xfrm>
             <a:off x="8640000" y="2952000"/>
-            <a:ext cx="720000" cy="216000"/>
+            <a:ext cx="719640" cy="215640"/>
           </a:xfrm>
           <a:prstGeom prst="flowChartProcess">
             <a:avLst/>
@@ -2528,10 +2419,18 @@
         <p:txBody>
           <a:bodyPr wrap="none" lIns="90000" rIns="90000" tIns="45000" bIns="45000" anchor="ctr"/>
           <a:p>
-            <a:pPr algn="ctr"/>
+            <a:pPr algn="ctr">
+              <a:lnSpc>
+                <a:spcPct val="100000"/>
+              </a:lnSpc>
+            </a:pPr>
             <a:r>
               <a:rPr b="0" lang="en-IN" sz="900" spc="-1" strike="noStrike">
-                <a:latin typeface="Arial"/>
+                <a:solidFill>
+                  <a:srgbClr val="000000"/>
+                </a:solidFill>
+                <a:latin typeface="Arial"/>
+                <a:ea typeface="DejaVu Sans"/>
               </a:rPr>
               <a:t>Database</a:t>
             </a:r>
@@ -2543,20 +2442,20 @@
       </p:sp>
       <p:sp>
         <p:nvSpPr>
-          <p:cNvPr id="59" name="Freeform 17"/>
+          <p:cNvPr id="55" name="CustomShape 17"/>
           <p:cNvSpPr/>
           <p:nvPr/>
         </p:nvSpPr>
         <p:spPr>
           <a:xfrm>
             <a:off x="5832000" y="1728000"/>
-            <a:ext cx="1080360" cy="1872360"/>
+            <a:ext cx="1080000" cy="1872000"/>
           </a:xfrm>
           <a:custGeom>
             <a:avLst/>
             <a:gdLst/>
             <a:ahLst/>
-            <a:rect l="0" t="0" r="r" b="b"/>
+            <a:rect l="l" t="t" r="r" b="b"/>
             <a:pathLst>
               <a:path w="3001" h="5201">
                 <a:moveTo>
@@ -2570,23 +2469,30 @@
               </a:path>
             </a:pathLst>
           </a:custGeom>
+          <a:noFill/>
           <a:ln>
             <a:solidFill>
               <a:srgbClr val="000000"/>
             </a:solidFill>
           </a:ln>
         </p:spPr>
-      </p:sp>
-      <p:sp>
-        <p:nvSpPr>
-          <p:cNvPr id="60" name="CustomShape 18"/>
+        <p:style>
+          <a:lnRef idx="0"/>
+          <a:fillRef idx="0"/>
+          <a:effectRef idx="0"/>
+          <a:fontRef idx="minor"/>
+        </p:style>
+      </p:sp>
+      <p:sp>
+        <p:nvSpPr>
+          <p:cNvPr id="56" name="CustomShape 18"/>
           <p:cNvSpPr/>
           <p:nvPr/>
         </p:nvSpPr>
         <p:spPr>
           <a:xfrm>
             <a:off x="2952000" y="2448000"/>
-            <a:ext cx="144000" cy="144000"/>
+            <a:ext cx="143640" cy="143640"/>
           </a:xfrm>
           <a:prstGeom prst="flowChartProcess">
             <a:avLst/>
@@ -2609,10 +2515,18 @@
         <p:txBody>
           <a:bodyPr wrap="none" lIns="90000" rIns="90000" tIns="45000" bIns="45000" anchor="ctr"/>
           <a:p>
-            <a:pPr algn="ctr"/>
+            <a:pPr algn="ctr">
+              <a:lnSpc>
+                <a:spcPct val="100000"/>
+              </a:lnSpc>
+            </a:pPr>
             <a:r>
               <a:rPr b="0" lang="en-IN" sz="1000" spc="-1" strike="noStrike">
-                <a:latin typeface="Arial"/>
+                <a:solidFill>
+                  <a:srgbClr val="000000"/>
+                </a:solidFill>
+                <a:latin typeface="Arial"/>
+                <a:ea typeface="DejaVu Sans"/>
               </a:rPr>
               <a:t>3</a:t>
             </a:r>
@@ -2624,14 +2538,14 @@
       </p:sp>
       <p:sp>
         <p:nvSpPr>
-          <p:cNvPr id="61" name="CustomShape 19"/>
+          <p:cNvPr id="57" name="CustomShape 19"/>
           <p:cNvSpPr/>
           <p:nvPr/>
         </p:nvSpPr>
         <p:spPr>
           <a:xfrm>
             <a:off x="3312000" y="2952000"/>
-            <a:ext cx="144000" cy="144000"/>
+            <a:ext cx="143640" cy="143640"/>
           </a:xfrm>
           <a:prstGeom prst="flowChartProcess">
             <a:avLst/>
@@ -2654,10 +2568,18 @@
         <p:txBody>
           <a:bodyPr wrap="none" lIns="90000" rIns="90000" tIns="45000" bIns="45000" anchor="ctr"/>
           <a:p>
-            <a:pPr algn="ctr"/>
+            <a:pPr algn="ctr">
+              <a:lnSpc>
+                <a:spcPct val="100000"/>
+              </a:lnSpc>
+            </a:pPr>
             <a:r>
               <a:rPr b="0" lang="en-IN" sz="1000" spc="-1" strike="noStrike">
-                <a:latin typeface="Arial"/>
+                <a:solidFill>
+                  <a:srgbClr val="000000"/>
+                </a:solidFill>
+                <a:latin typeface="Arial"/>
+                <a:ea typeface="DejaVu Sans"/>
               </a:rPr>
               <a:t>2</a:t>
             </a:r>
@@ -2669,14 +2591,14 @@
       </p:sp>
       <p:sp>
         <p:nvSpPr>
-          <p:cNvPr id="62" name="CustomShape 20"/>
+          <p:cNvPr id="58" name="CustomShape 20"/>
           <p:cNvSpPr/>
           <p:nvPr/>
         </p:nvSpPr>
         <p:spPr>
           <a:xfrm>
             <a:off x="4392000" y="2448000"/>
-            <a:ext cx="144000" cy="144000"/>
+            <a:ext cx="143640" cy="143640"/>
           </a:xfrm>
           <a:prstGeom prst="flowChartProcess">
             <a:avLst/>
@@ -2699,10 +2621,18 @@
         <p:txBody>
           <a:bodyPr wrap="none" lIns="90000" rIns="90000" tIns="45000" bIns="45000" anchor="ctr"/>
           <a:p>
-            <a:pPr algn="ctr"/>
+            <a:pPr algn="ctr">
+              <a:lnSpc>
+                <a:spcPct val="100000"/>
+              </a:lnSpc>
+            </a:pPr>
             <a:r>
               <a:rPr b="0" lang="en-IN" sz="1000" spc="-1" strike="noStrike">
-                <a:latin typeface="Arial"/>
+                <a:solidFill>
+                  <a:srgbClr val="000000"/>
+                </a:solidFill>
+                <a:latin typeface="Arial"/>
+                <a:ea typeface="DejaVu Sans"/>
               </a:rPr>
               <a:t>4</a:t>
             </a:r>
@@ -2714,14 +2644,14 @@
       </p:sp>
       <p:sp>
         <p:nvSpPr>
-          <p:cNvPr id="63" name="CustomShape 21"/>
+          <p:cNvPr id="59" name="CustomShape 21"/>
           <p:cNvSpPr/>
           <p:nvPr/>
         </p:nvSpPr>
         <p:spPr>
           <a:xfrm>
             <a:off x="4320000" y="2952000"/>
-            <a:ext cx="144000" cy="144000"/>
+            <a:ext cx="143640" cy="143640"/>
           </a:xfrm>
           <a:prstGeom prst="flowChartProcess">
             <a:avLst/>
@@ -2744,10 +2674,18 @@
         <p:txBody>
           <a:bodyPr wrap="none" lIns="90000" rIns="90000" tIns="45000" bIns="45000" anchor="ctr"/>
           <a:p>
-            <a:pPr algn="ctr"/>
+            <a:pPr algn="ctr">
+              <a:lnSpc>
+                <a:spcPct val="100000"/>
+              </a:lnSpc>
+            </a:pPr>
             <a:r>
               <a:rPr b="0" lang="en-IN" sz="1000" spc="-1" strike="noStrike">
-                <a:latin typeface="Arial"/>
+                <a:solidFill>
+                  <a:srgbClr val="000000"/>
+                </a:solidFill>
+                <a:latin typeface="Arial"/>
+                <a:ea typeface="DejaVu Sans"/>
               </a:rPr>
               <a:t>5</a:t>
             </a:r>
@@ -2759,14 +2697,14 @@
       </p:sp>
       <p:sp>
         <p:nvSpPr>
-          <p:cNvPr id="64" name="CustomShape 22"/>
+          <p:cNvPr id="60" name="CustomShape 22"/>
           <p:cNvSpPr/>
           <p:nvPr/>
         </p:nvSpPr>
         <p:spPr>
           <a:xfrm>
             <a:off x="6120000" y="2520000"/>
-            <a:ext cx="144000" cy="144000"/>
+            <a:ext cx="143640" cy="143640"/>
           </a:xfrm>
           <a:prstGeom prst="flowChartProcess">
             <a:avLst/>
@@ -2789,10 +2727,18 @@
         <p:txBody>
           <a:bodyPr wrap="none" lIns="90000" rIns="90000" tIns="45000" bIns="45000" anchor="ctr"/>
           <a:p>
-            <a:pPr algn="ctr"/>
+            <a:pPr algn="ctr">
+              <a:lnSpc>
+                <a:spcPct val="100000"/>
+              </a:lnSpc>
+            </a:pPr>
             <a:r>
               <a:rPr b="0" lang="en-IN" sz="1000" spc="-1" strike="noStrike">
-                <a:latin typeface="Arial"/>
+                <a:solidFill>
+                  <a:srgbClr val="000000"/>
+                </a:solidFill>
+                <a:latin typeface="Arial"/>
+                <a:ea typeface="DejaVu Sans"/>
               </a:rPr>
               <a:t>6</a:t>
             </a:r>
@@ -2804,14 +2750,14 @@
       </p:sp>
       <p:sp>
         <p:nvSpPr>
-          <p:cNvPr id="65" name="CustomShape 23"/>
+          <p:cNvPr id="61" name="CustomShape 23"/>
           <p:cNvSpPr/>
           <p:nvPr/>
         </p:nvSpPr>
         <p:spPr>
           <a:xfrm>
             <a:off x="8064000" y="2448000"/>
-            <a:ext cx="144000" cy="144000"/>
+            <a:ext cx="143640" cy="143640"/>
           </a:xfrm>
           <a:prstGeom prst="flowChartProcess">
             <a:avLst/>
@@ -2834,10 +2780,18 @@
         <p:txBody>
           <a:bodyPr wrap="none" lIns="90000" rIns="90000" tIns="45000" bIns="45000" anchor="ctr"/>
           <a:p>
-            <a:pPr algn="ctr"/>
+            <a:pPr algn="ctr">
+              <a:lnSpc>
+                <a:spcPct val="100000"/>
+              </a:lnSpc>
+            </a:pPr>
             <a:r>
               <a:rPr b="0" lang="en-IN" sz="1000" spc="-1" strike="noStrike">
-                <a:latin typeface="Arial"/>
+                <a:solidFill>
+                  <a:srgbClr val="000000"/>
+                </a:solidFill>
+                <a:latin typeface="Arial"/>
+                <a:ea typeface="DejaVu Sans"/>
               </a:rPr>
               <a:t>7</a:t>
             </a:r>
@@ -2849,7 +2803,7 @@
       </p:sp>
       <p:sp>
         <p:nvSpPr>
-          <p:cNvPr id="66" name="Line 24"/>
+          <p:cNvPr id="62" name="Line 24"/>
           <p:cNvSpPr/>
           <p:nvPr/>
         </p:nvSpPr>
@@ -2876,14 +2830,14 @@
       </p:sp>
       <p:sp>
         <p:nvSpPr>
-          <p:cNvPr id="67" name="Line 25"/>
+          <p:cNvPr id="63" name="Line 25"/>
           <p:cNvSpPr/>
           <p:nvPr/>
         </p:nvSpPr>
         <p:spPr>
           <a:xfrm flipH="1">
             <a:off x="4104000" y="3528000"/>
-            <a:ext cx="648000" cy="0"/>
+            <a:ext cx="648000" cy="360"/>
           </a:xfrm>
           <a:prstGeom prst="line">
             <a:avLst/>
@@ -2903,14 +2857,14 @@
       </p:sp>
       <p:sp>
         <p:nvSpPr>
-          <p:cNvPr id="68" name="CustomShape 26"/>
+          <p:cNvPr id="64" name="CustomShape 26"/>
           <p:cNvSpPr/>
           <p:nvPr/>
         </p:nvSpPr>
         <p:spPr>
           <a:xfrm>
             <a:off x="1368000" y="2376000"/>
-            <a:ext cx="144000" cy="144000"/>
+            <a:ext cx="143640" cy="143640"/>
           </a:xfrm>
           <a:prstGeom prst="flowChartProcess">
             <a:avLst/>
@@ -2933,14 +2887,115 @@
         <p:txBody>
           <a:bodyPr wrap="none" lIns="90000" rIns="90000" tIns="45000" bIns="45000" anchor="ctr"/>
           <a:p>
-            <a:pPr algn="ctr"/>
+            <a:pPr algn="ctr">
+              <a:lnSpc>
+                <a:spcPct val="100000"/>
+              </a:lnSpc>
+            </a:pPr>
             <a:r>
               <a:rPr b="0" lang="en-IN" sz="1000" spc="-1" strike="noStrike">
-                <a:latin typeface="Arial"/>
+                <a:solidFill>
+                  <a:srgbClr val="000000"/>
+                </a:solidFill>
+                <a:latin typeface="Arial"/>
+                <a:ea typeface="DejaVu Sans"/>
               </a:rPr>
               <a:t>1</a:t>
             </a:r>
             <a:endParaRPr b="0" lang="en-IN" sz="1000" spc="-1" strike="noStrike">
+              <a:latin typeface="Arial"/>
+            </a:endParaRPr>
+          </a:p>
+        </p:txBody>
+      </p:sp>
+      <p:sp>
+        <p:nvSpPr>
+          <p:cNvPr id="65" name="CustomShape 27"/>
+          <p:cNvSpPr/>
+          <p:nvPr/>
+        </p:nvSpPr>
+        <p:spPr>
+          <a:xfrm>
+            <a:off x="4608360" y="2232000"/>
+            <a:ext cx="1151640" cy="576000"/>
+          </a:xfrm>
+          <a:prstGeom prst="flowChartProcess">
+            <a:avLst/>
+          </a:prstGeom>
+          <a:solidFill>
+            <a:srgbClr val="cfe7f5"/>
+          </a:solidFill>
+          <a:ln>
+            <a:solidFill>
+              <a:srgbClr val="808080"/>
+            </a:solidFill>
+          </a:ln>
+        </p:spPr>
+        <p:style>
+          <a:lnRef idx="0"/>
+          <a:fillRef idx="0"/>
+          <a:effectRef idx="0"/>
+          <a:fontRef idx="minor"/>
+        </p:style>
+        <p:txBody>
+          <a:bodyPr wrap="none" lIns="90000" rIns="90000" tIns="45000" bIns="45000" anchor="ctr"/>
+          <a:p>
+            <a:pPr algn="ctr">
+              <a:lnSpc>
+                <a:spcPct val="100000"/>
+              </a:lnSpc>
+            </a:pPr>
+            <a:r>
+              <a:rPr b="0" lang="en-IN" sz="1200" spc="-1" strike="noStrike">
+                <a:solidFill>
+                  <a:srgbClr val="000000"/>
+                </a:solidFill>
+                <a:latin typeface="Arial"/>
+                <a:ea typeface="DejaVu Sans"/>
+              </a:rPr>
+              <a:t>StudentService</a:t>
+            </a:r>
+            <a:endParaRPr b="0" lang="en-IN" sz="1200" spc="-1" strike="noStrike">
+              <a:latin typeface="Arial"/>
+            </a:endParaRPr>
+          </a:p>
+          <a:p>
+            <a:pPr algn="ctr">
+              <a:lnSpc>
+                <a:spcPct val="100000"/>
+              </a:lnSpc>
+            </a:pPr>
+            <a:r>
+              <a:rPr b="0" lang="en-IN" sz="900" spc="-1" strike="noStrike">
+                <a:solidFill>
+                  <a:srgbClr val="000000"/>
+                </a:solidFill>
+                <a:latin typeface="Arial"/>
+                <a:ea typeface="DejaVu Sans"/>
+              </a:rPr>
+              <a:t>(Exposed Service)</a:t>
+            </a:r>
+            <a:endParaRPr b="0" lang="en-IN" sz="900" spc="-1" strike="noStrike">
+              <a:latin typeface="Arial"/>
+            </a:endParaRPr>
+          </a:p>
+          <a:p>
+            <a:pPr algn="ctr">
+              <a:lnSpc>
+                <a:spcPct val="100000"/>
+              </a:lnSpc>
+            </a:pPr>
+            <a:r>
+              <a:rPr b="0" lang="en-IN" sz="900" spc="-1" strike="noStrike">
+                <a:solidFill>
+                  <a:srgbClr val="000000"/>
+                </a:solidFill>
+                <a:latin typeface="Arial"/>
+                <a:ea typeface="DejaVu Sans"/>
+              </a:rPr>
+              <a:t>8081</a:t>
+            </a:r>
+            <a:endParaRPr b="0" lang="en-IN" sz="900" spc="-1" strike="noStrike">
               <a:latin typeface="Arial"/>
             </a:endParaRPr>
           </a:p>

</xml_diff>